<commit_message>
Vortrag - Beginn und erste Bilder.
</commit_message>
<xml_diff>
--- a/2-Entwurf/1-Phasenartefakt/Vortrag/Vortrag - Entwurf.pptx
+++ b/2-Entwurf/1-Phasenartefakt/Vortrag/Vortrag - Entwurf.pptx
@@ -6,6 +6,19 @@
   </p:sldMasterIdLst>
   <p:sldIdLst>
     <p:sldId id="256" r:id="rId2"/>
+    <p:sldId id="258" r:id="rId3"/>
+    <p:sldId id="259" r:id="rId4"/>
+    <p:sldId id="260" r:id="rId5"/>
+    <p:sldId id="261" r:id="rId6"/>
+    <p:sldId id="262" r:id="rId7"/>
+    <p:sldId id="263" r:id="rId8"/>
+    <p:sldId id="264" r:id="rId9"/>
+    <p:sldId id="265" r:id="rId10"/>
+    <p:sldId id="266" r:id="rId11"/>
+    <p:sldId id="267" r:id="rId12"/>
+    <p:sldId id="268" r:id="rId13"/>
+    <p:sldId id="269" r:id="rId14"/>
+    <p:sldId id="270" r:id="rId15"/>
   </p:sldIdLst>
   <p:sldSz cx="12192000" cy="6858000"/>
   <p:notesSz cx="6858000" cy="9144000"/>
@@ -259,7 +272,7 @@
           <a:p>
             <a:fld id="{3522928F-4890-439F-A0A3-184587B4358B}" type="datetimeFigureOut">
               <a:rPr lang="de-DE" smtClean="0"/>
-              <a:t>26.06.2019</a:t>
+              <a:t>07.07.2019</a:t>
             </a:fld>
             <a:endParaRPr lang="de-DE"/>
           </a:p>
@@ -329,18 +342,6 @@
   <p:clrMapOvr>
     <a:masterClrMapping/>
   </p:clrMapOvr>
-  <mc:AlternateContent xmlns:mc="http://schemas.openxmlformats.org/markup-compatibility/2006" xmlns:p159="http://schemas.microsoft.com/office/powerpoint/2015/09/main">
-    <mc:Choice Requires="p159">
-      <p:transition xmlns:p14="http://schemas.microsoft.com/office/powerpoint/2010/main" spd="slow" p14:dur="2000">
-        <p159:morph option="byObject"/>
-      </p:transition>
-    </mc:Choice>
-    <mc:Fallback xmlns="">
-      <p:transition spd="slow">
-        <p:fade/>
-      </p:transition>
-    </mc:Fallback>
-  </mc:AlternateContent>
 </p:sldLayout>
 </file>
 
@@ -469,7 +470,7 @@
           <a:p>
             <a:fld id="{3522928F-4890-439F-A0A3-184587B4358B}" type="datetimeFigureOut">
               <a:rPr lang="de-DE" smtClean="0"/>
-              <a:t>26.06.2019</a:t>
+              <a:t>07.07.2019</a:t>
             </a:fld>
             <a:endParaRPr lang="de-DE"/>
           </a:p>
@@ -539,18 +540,6 @@
   <p:clrMapOvr>
     <a:masterClrMapping/>
   </p:clrMapOvr>
-  <mc:AlternateContent xmlns:mc="http://schemas.openxmlformats.org/markup-compatibility/2006" xmlns:p159="http://schemas.microsoft.com/office/powerpoint/2015/09/main">
-    <mc:Choice Requires="p159">
-      <p:transition xmlns:p14="http://schemas.microsoft.com/office/powerpoint/2010/main" spd="slow" p14:dur="2000">
-        <p159:morph option="byObject"/>
-      </p:transition>
-    </mc:Choice>
-    <mc:Fallback xmlns="">
-      <p:transition spd="slow">
-        <p:fade/>
-      </p:transition>
-    </mc:Fallback>
-  </mc:AlternateContent>
 </p:sldLayout>
 </file>
 
@@ -689,7 +678,7 @@
           <a:p>
             <a:fld id="{3522928F-4890-439F-A0A3-184587B4358B}" type="datetimeFigureOut">
               <a:rPr lang="de-DE" smtClean="0"/>
-              <a:t>26.06.2019</a:t>
+              <a:t>07.07.2019</a:t>
             </a:fld>
             <a:endParaRPr lang="de-DE"/>
           </a:p>
@@ -759,18 +748,6 @@
   <p:clrMapOvr>
     <a:masterClrMapping/>
   </p:clrMapOvr>
-  <mc:AlternateContent xmlns:mc="http://schemas.openxmlformats.org/markup-compatibility/2006" xmlns:p159="http://schemas.microsoft.com/office/powerpoint/2015/09/main">
-    <mc:Choice Requires="p159">
-      <p:transition xmlns:p14="http://schemas.microsoft.com/office/powerpoint/2010/main" spd="slow" p14:dur="2000">
-        <p159:morph option="byObject"/>
-      </p:transition>
-    </mc:Choice>
-    <mc:Fallback xmlns="">
-      <p:transition spd="slow">
-        <p:fade/>
-      </p:transition>
-    </mc:Fallback>
-  </mc:AlternateContent>
 </p:sldLayout>
 </file>
 
@@ -899,7 +876,7 @@
           <a:p>
             <a:fld id="{3522928F-4890-439F-A0A3-184587B4358B}" type="datetimeFigureOut">
               <a:rPr lang="de-DE" smtClean="0"/>
-              <a:t>26.06.2019</a:t>
+              <a:t>07.07.2019</a:t>
             </a:fld>
             <a:endParaRPr lang="de-DE"/>
           </a:p>
@@ -969,18 +946,6 @@
   <p:clrMapOvr>
     <a:masterClrMapping/>
   </p:clrMapOvr>
-  <mc:AlternateContent xmlns:mc="http://schemas.openxmlformats.org/markup-compatibility/2006" xmlns:p159="http://schemas.microsoft.com/office/powerpoint/2015/09/main">
-    <mc:Choice Requires="p159">
-      <p:transition xmlns:p14="http://schemas.microsoft.com/office/powerpoint/2010/main" spd="slow" p14:dur="2000">
-        <p159:morph option="byObject"/>
-      </p:transition>
-    </mc:Choice>
-    <mc:Fallback xmlns="">
-      <p:transition spd="slow">
-        <p:fade/>
-      </p:transition>
-    </mc:Fallback>
-  </mc:AlternateContent>
 </p:sldLayout>
 </file>
 
@@ -1186,7 +1151,7 @@
           <a:p>
             <a:fld id="{3522928F-4890-439F-A0A3-184587B4358B}" type="datetimeFigureOut">
               <a:rPr lang="de-DE" smtClean="0"/>
-              <a:t>26.06.2019</a:t>
+              <a:t>07.07.2019</a:t>
             </a:fld>
             <a:endParaRPr lang="de-DE"/>
           </a:p>
@@ -1256,18 +1221,6 @@
   <p:clrMapOvr>
     <a:masterClrMapping/>
   </p:clrMapOvr>
-  <mc:AlternateContent xmlns:mc="http://schemas.openxmlformats.org/markup-compatibility/2006" xmlns:p159="http://schemas.microsoft.com/office/powerpoint/2015/09/main">
-    <mc:Choice Requires="p159">
-      <p:transition xmlns:p14="http://schemas.microsoft.com/office/powerpoint/2010/main" spd="slow" p14:dur="2000">
-        <p159:morph option="byObject"/>
-      </p:transition>
-    </mc:Choice>
-    <mc:Fallback xmlns="">
-      <p:transition spd="slow">
-        <p:fade/>
-      </p:transition>
-    </mc:Fallback>
-  </mc:AlternateContent>
 </p:sldLayout>
 </file>
 
@@ -1463,7 +1416,7 @@
           <a:p>
             <a:fld id="{3522928F-4890-439F-A0A3-184587B4358B}" type="datetimeFigureOut">
               <a:rPr lang="de-DE" smtClean="0"/>
-              <a:t>26.06.2019</a:t>
+              <a:t>07.07.2019</a:t>
             </a:fld>
             <a:endParaRPr lang="de-DE"/>
           </a:p>
@@ -1533,18 +1486,6 @@
   <p:clrMapOvr>
     <a:masterClrMapping/>
   </p:clrMapOvr>
-  <mc:AlternateContent xmlns:mc="http://schemas.openxmlformats.org/markup-compatibility/2006" xmlns:p159="http://schemas.microsoft.com/office/powerpoint/2015/09/main">
-    <mc:Choice Requires="p159">
-      <p:transition xmlns:p14="http://schemas.microsoft.com/office/powerpoint/2010/main" spd="slow" p14:dur="2000">
-        <p159:morph option="byObject"/>
-      </p:transition>
-    </mc:Choice>
-    <mc:Fallback xmlns="">
-      <p:transition spd="slow">
-        <p:fade/>
-      </p:transition>
-    </mc:Fallback>
-  </mc:AlternateContent>
 </p:sldLayout>
 </file>
 
@@ -1887,7 +1828,7 @@
           <a:p>
             <a:fld id="{3522928F-4890-439F-A0A3-184587B4358B}" type="datetimeFigureOut">
               <a:rPr lang="de-DE" smtClean="0"/>
-              <a:t>26.06.2019</a:t>
+              <a:t>07.07.2019</a:t>
             </a:fld>
             <a:endParaRPr lang="de-DE"/>
           </a:p>
@@ -1957,18 +1898,6 @@
   <p:clrMapOvr>
     <a:masterClrMapping/>
   </p:clrMapOvr>
-  <mc:AlternateContent xmlns:mc="http://schemas.openxmlformats.org/markup-compatibility/2006" xmlns:p159="http://schemas.microsoft.com/office/powerpoint/2015/09/main">
-    <mc:Choice Requires="p159">
-      <p:transition xmlns:p14="http://schemas.microsoft.com/office/powerpoint/2010/main" spd="slow" p14:dur="2000">
-        <p159:morph option="byObject"/>
-      </p:transition>
-    </mc:Choice>
-    <mc:Fallback xmlns="">
-      <p:transition spd="slow">
-        <p:fade/>
-      </p:transition>
-    </mc:Fallback>
-  </mc:AlternateContent>
 </p:sldLayout>
 </file>
 
@@ -2040,7 +1969,7 @@
           <a:p>
             <a:fld id="{3522928F-4890-439F-A0A3-184587B4358B}" type="datetimeFigureOut">
               <a:rPr lang="de-DE" smtClean="0"/>
-              <a:t>26.06.2019</a:t>
+              <a:t>07.07.2019</a:t>
             </a:fld>
             <a:endParaRPr lang="de-DE"/>
           </a:p>
@@ -2110,18 +2039,6 @@
   <p:clrMapOvr>
     <a:masterClrMapping/>
   </p:clrMapOvr>
-  <mc:AlternateContent xmlns:mc="http://schemas.openxmlformats.org/markup-compatibility/2006" xmlns:p159="http://schemas.microsoft.com/office/powerpoint/2015/09/main">
-    <mc:Choice Requires="p159">
-      <p:transition xmlns:p14="http://schemas.microsoft.com/office/powerpoint/2010/main" spd="slow" p14:dur="2000">
-        <p159:morph option="byObject"/>
-      </p:transition>
-    </mc:Choice>
-    <mc:Fallback xmlns="">
-      <p:transition spd="slow">
-        <p:fade/>
-      </p:transition>
-    </mc:Fallback>
-  </mc:AlternateContent>
 </p:sldLayout>
 </file>
 
@@ -2165,7 +2082,7 @@
           <a:p>
             <a:fld id="{3522928F-4890-439F-A0A3-184587B4358B}" type="datetimeFigureOut">
               <a:rPr lang="de-DE" smtClean="0"/>
-              <a:t>26.06.2019</a:t>
+              <a:t>07.07.2019</a:t>
             </a:fld>
             <a:endParaRPr lang="de-DE"/>
           </a:p>
@@ -2235,18 +2152,6 @@
   <p:clrMapOvr>
     <a:masterClrMapping/>
   </p:clrMapOvr>
-  <mc:AlternateContent xmlns:mc="http://schemas.openxmlformats.org/markup-compatibility/2006" xmlns:p159="http://schemas.microsoft.com/office/powerpoint/2015/09/main">
-    <mc:Choice Requires="p159">
-      <p:transition xmlns:p14="http://schemas.microsoft.com/office/powerpoint/2010/main" spd="slow" p14:dur="2000">
-        <p159:morph option="byObject"/>
-      </p:transition>
-    </mc:Choice>
-    <mc:Fallback xmlns="">
-      <p:transition spd="slow">
-        <p:fade/>
-      </p:transition>
-    </mc:Fallback>
-  </mc:AlternateContent>
 </p:sldLayout>
 </file>
 
@@ -2488,7 +2393,7 @@
           <a:p>
             <a:fld id="{3522928F-4890-439F-A0A3-184587B4358B}" type="datetimeFigureOut">
               <a:rPr lang="de-DE" smtClean="0"/>
-              <a:t>26.06.2019</a:t>
+              <a:t>07.07.2019</a:t>
             </a:fld>
             <a:endParaRPr lang="de-DE"/>
           </a:p>
@@ -2558,18 +2463,6 @@
   <p:clrMapOvr>
     <a:masterClrMapping/>
   </p:clrMapOvr>
-  <mc:AlternateContent xmlns:mc="http://schemas.openxmlformats.org/markup-compatibility/2006" xmlns:p159="http://schemas.microsoft.com/office/powerpoint/2015/09/main">
-    <mc:Choice Requires="p159">
-      <p:transition xmlns:p14="http://schemas.microsoft.com/office/powerpoint/2010/main" spd="slow" p14:dur="2000">
-        <p159:morph option="byObject"/>
-      </p:transition>
-    </mc:Choice>
-    <mc:Fallback xmlns="">
-      <p:transition spd="slow">
-        <p:fade/>
-      </p:transition>
-    </mc:Fallback>
-  </mc:AlternateContent>
 </p:sldLayout>
 </file>
 
@@ -2788,7 +2681,7 @@
           <a:p>
             <a:fld id="{3522928F-4890-439F-A0A3-184587B4358B}" type="datetimeFigureOut">
               <a:rPr lang="de-DE" smtClean="0"/>
-              <a:t>26.06.2019</a:t>
+              <a:t>07.07.2019</a:t>
             </a:fld>
             <a:endParaRPr lang="de-DE"/>
           </a:p>
@@ -2858,18 +2751,6 @@
   <p:clrMapOvr>
     <a:masterClrMapping/>
   </p:clrMapOvr>
-  <mc:AlternateContent xmlns:mc="http://schemas.openxmlformats.org/markup-compatibility/2006" xmlns:p159="http://schemas.microsoft.com/office/powerpoint/2015/09/main">
-    <mc:Choice Requires="p159">
-      <p:transition xmlns:p14="http://schemas.microsoft.com/office/powerpoint/2010/main" spd="slow" p14:dur="2000">
-        <p159:morph option="byObject"/>
-      </p:transition>
-    </mc:Choice>
-    <mc:Fallback xmlns="">
-      <p:transition spd="slow">
-        <p:fade/>
-      </p:transition>
-    </mc:Fallback>
-  </mc:AlternateContent>
 </p:sldLayout>
 </file>
 
@@ -3041,7 +2922,7 @@
           <a:p>
             <a:fld id="{3522928F-4890-439F-A0A3-184587B4358B}" type="datetimeFigureOut">
               <a:rPr lang="de-DE" smtClean="0"/>
-              <a:t>26.06.2019</a:t>
+              <a:t>07.07.2019</a:t>
             </a:fld>
             <a:endParaRPr lang="de-DE"/>
           </a:p>
@@ -3158,18 +3039,6 @@
     <p:sldLayoutId id="2147483658" r:id="rId10"/>
     <p:sldLayoutId id="2147483659" r:id="rId11"/>
   </p:sldLayoutIdLst>
-  <mc:AlternateContent xmlns:mc="http://schemas.openxmlformats.org/markup-compatibility/2006" xmlns:p159="http://schemas.microsoft.com/office/powerpoint/2015/09/main">
-    <mc:Choice Requires="p159">
-      <p:transition xmlns:p14="http://schemas.microsoft.com/office/powerpoint/2010/main" spd="slow" p14:dur="2000">
-        <p159:morph option="byObject"/>
-      </p:transition>
-    </mc:Choice>
-    <mc:Fallback xmlns="">
-      <p:transition spd="slow">
-        <p:fade/>
-      </p:transition>
-    </mc:Fallback>
-  </mc:AlternateContent>
   <p:txStyles>
     <p:titleStyle>
       <a:lvl1pPr algn="l" defTabSz="914400" rtl="0" eaLnBrk="1" latinLnBrk="0" hangingPunct="1">
@@ -3472,10 +3341,10 @@
       </p:grpSpPr>
       <p:pic>
         <p:nvPicPr>
-          <p:cNvPr id="4" name="Grafik 3" descr="Ein Bild, das Text, Karte enthält.&#10;&#10;Mit sehr hoher Zuverlässigkeit generierte Beschreibung">
-            <a:extLst>
-              <a:ext uri="{FF2B5EF4-FFF2-40B4-BE49-F238E27FC236}">
-                <a16:creationId xmlns:a16="http://schemas.microsoft.com/office/drawing/2014/main" id="{B6BDED02-6AAF-4084-82A3-2D1F1C5E9304}"/>
+          <p:cNvPr id="7" name="Grafik 6">
+            <a:extLst>
+              <a:ext uri="{FF2B5EF4-FFF2-40B4-BE49-F238E27FC236}">
+                <a16:creationId xmlns:a16="http://schemas.microsoft.com/office/drawing/2014/main" id="{F85BA149-8DA7-4974-AFC9-7AECE7F451AC}"/>
               </a:ext>
             </a:extLst>
           </p:cNvPr>
@@ -3490,6 +3359,9 @@
               <a:ext uri="{28A0092B-C50C-407E-A947-70E740481C1C}">
                 <a14:useLocalDpi xmlns:a14="http://schemas.microsoft.com/office/drawing/2010/main" val="0"/>
               </a:ext>
+              <a:ext uri="{96DAC541-7B7A-43D3-8B79-37D633B846F1}">
+                <asvg:svgBlip xmlns:asvg="http://schemas.microsoft.com/office/drawing/2016/SVG/main" r:embed="rId3"/>
+              </a:ext>
             </a:extLst>
           </a:blip>
           <a:stretch>
@@ -3498,8 +3370,171 @@
         </p:blipFill>
         <p:spPr>
           <a:xfrm>
-            <a:off x="2961434" y="829242"/>
-            <a:ext cx="5846696" cy="5199515"/>
+            <a:off x="6642328" y="3597728"/>
+            <a:ext cx="3984236" cy="1926772"/>
+          </a:xfrm>
+          <a:prstGeom prst="rect">
+            <a:avLst/>
+          </a:prstGeom>
+        </p:spPr>
+      </p:pic>
+      <p:pic>
+        <p:nvPicPr>
+          <p:cNvPr id="9" name="Grafik 8">
+            <a:extLst>
+              <a:ext uri="{FF2B5EF4-FFF2-40B4-BE49-F238E27FC236}">
+                <a16:creationId xmlns:a16="http://schemas.microsoft.com/office/drawing/2014/main" id="{F3B6BB37-02D9-4437-91BB-EADBC4F85907}"/>
+              </a:ext>
+            </a:extLst>
+          </p:cNvPr>
+          <p:cNvPicPr>
+            <a:picLocks noChangeAspect="1"/>
+          </p:cNvPicPr>
+          <p:nvPr/>
+        </p:nvPicPr>
+        <p:blipFill>
+          <a:blip r:embed="rId4">
+            <a:extLst>
+              <a:ext uri="{28A0092B-C50C-407E-A947-70E740481C1C}">
+                <a14:useLocalDpi xmlns:a14="http://schemas.microsoft.com/office/drawing/2010/main" val="0"/>
+              </a:ext>
+            </a:extLst>
+          </a:blip>
+          <a:stretch>
+            <a:fillRect/>
+          </a:stretch>
+        </p:blipFill>
+        <p:spPr>
+          <a:xfrm>
+            <a:off x="1262062" y="889906"/>
+            <a:ext cx="3299935" cy="1758044"/>
+          </a:xfrm>
+          <a:prstGeom prst="rect">
+            <a:avLst/>
+          </a:prstGeom>
+        </p:spPr>
+      </p:pic>
+      <p:cxnSp>
+        <p:nvCxnSpPr>
+          <p:cNvPr id="11" name="Gerade Verbindung mit Pfeil 10">
+            <a:extLst>
+              <a:ext uri="{FF2B5EF4-FFF2-40B4-BE49-F238E27FC236}">
+                <a16:creationId xmlns:a16="http://schemas.microsoft.com/office/drawing/2014/main" id="{93F1AFCB-729A-451C-92BF-F34320E9EF11}"/>
+              </a:ext>
+            </a:extLst>
+          </p:cNvPr>
+          <p:cNvCxnSpPr>
+            <a:cxnSpLocks/>
+            <a:endCxn id="7" idx="1"/>
+          </p:cNvCxnSpPr>
+          <p:nvPr/>
+        </p:nvCxnSpPr>
+        <p:spPr>
+          <a:xfrm>
+            <a:off x="3194304" y="4495800"/>
+            <a:ext cx="3448024" cy="65314"/>
+          </a:xfrm>
+          <a:prstGeom prst="straightConnector1">
+            <a:avLst/>
+          </a:prstGeom>
+          <a:ln w="139700">
+            <a:solidFill>
+              <a:schemeClr val="tx1"/>
+            </a:solidFill>
+            <a:round/>
+            <a:tailEnd type="triangle"/>
+          </a:ln>
+        </p:spPr>
+        <p:style>
+          <a:lnRef idx="1">
+            <a:schemeClr val="accent1"/>
+          </a:lnRef>
+          <a:fillRef idx="0">
+            <a:schemeClr val="accent1"/>
+          </a:fillRef>
+          <a:effectRef idx="0">
+            <a:schemeClr val="accent1"/>
+          </a:effectRef>
+          <a:fontRef idx="minor">
+            <a:schemeClr val="tx1"/>
+          </a:fontRef>
+        </p:style>
+      </p:cxnSp>
+      <p:cxnSp>
+        <p:nvCxnSpPr>
+          <p:cNvPr id="16" name="Gerader Verbinder 15">
+            <a:extLst>
+              <a:ext uri="{FF2B5EF4-FFF2-40B4-BE49-F238E27FC236}">
+                <a16:creationId xmlns:a16="http://schemas.microsoft.com/office/drawing/2014/main" id="{16004986-1DD6-420F-8FFC-BDFEA7521C5A}"/>
+              </a:ext>
+            </a:extLst>
+          </p:cNvPr>
+          <p:cNvCxnSpPr>
+            <a:cxnSpLocks/>
+            <a:endCxn id="9" idx="2"/>
+          </p:cNvCxnSpPr>
+          <p:nvPr/>
+        </p:nvCxnSpPr>
+        <p:spPr>
+          <a:xfrm flipH="1" flipV="1">
+            <a:off x="2912030" y="2647950"/>
+            <a:ext cx="282274" cy="1913164"/>
+          </a:xfrm>
+          <a:prstGeom prst="line">
+            <a:avLst/>
+          </a:prstGeom>
+          <a:ln w="139700">
+            <a:solidFill>
+              <a:schemeClr val="tx1"/>
+            </a:solidFill>
+            <a:round/>
+          </a:ln>
+        </p:spPr>
+        <p:style>
+          <a:lnRef idx="1">
+            <a:schemeClr val="accent1"/>
+          </a:lnRef>
+          <a:fillRef idx="0">
+            <a:schemeClr val="accent1"/>
+          </a:fillRef>
+          <a:effectRef idx="0">
+            <a:schemeClr val="accent1"/>
+          </a:effectRef>
+          <a:fontRef idx="minor">
+            <a:schemeClr val="tx1"/>
+          </a:fontRef>
+        </p:style>
+      </p:cxnSp>
+      <p:pic>
+        <p:nvPicPr>
+          <p:cNvPr id="21" name="Grafik 20">
+            <a:extLst>
+              <a:ext uri="{FF2B5EF4-FFF2-40B4-BE49-F238E27FC236}">
+                <a16:creationId xmlns:a16="http://schemas.microsoft.com/office/drawing/2014/main" id="{547E772F-A343-4D44-899E-F79E05F8DF60}"/>
+              </a:ext>
+            </a:extLst>
+          </p:cNvPr>
+          <p:cNvPicPr>
+            <a:picLocks noChangeAspect="1"/>
+          </p:cNvPicPr>
+          <p:nvPr/>
+        </p:nvPicPr>
+        <p:blipFill>
+          <a:blip r:embed="rId5">
+            <a:extLst>
+              <a:ext uri="{28A0092B-C50C-407E-A947-70E740481C1C}">
+                <a14:useLocalDpi xmlns:a14="http://schemas.microsoft.com/office/drawing/2010/main" val="0"/>
+              </a:ext>
+            </a:extLst>
+          </a:blip>
+          <a:stretch>
+            <a:fillRect/>
+          </a:stretch>
+        </p:blipFill>
+        <p:spPr>
+          <a:xfrm>
+            <a:off x="3520084" y="3658004"/>
+            <a:ext cx="2083826" cy="552047"/>
           </a:xfrm>
           <a:prstGeom prst="rect">
             <a:avLst/>
@@ -3509,25 +3544,403 @@
     </p:spTree>
     <p:extLst>
       <p:ext uri="{BB962C8B-B14F-4D97-AF65-F5344CB8AC3E}">
-        <p14:creationId xmlns:p14="http://schemas.microsoft.com/office/powerpoint/2010/main" val="222122834"/>
+        <p14:creationId xmlns:p14="http://schemas.microsoft.com/office/powerpoint/2010/main" val="1720925172"/>
       </p:ext>
     </p:extLst>
   </p:cSld>
   <p:clrMapOvr>
     <a:masterClrMapping/>
   </p:clrMapOvr>
-  <mc:AlternateContent xmlns:mc="http://schemas.openxmlformats.org/markup-compatibility/2006" xmlns:p159="http://schemas.microsoft.com/office/powerpoint/2015/09/main">
-    <mc:Choice Requires="p159">
-      <p:transition xmlns:p14="http://schemas.microsoft.com/office/powerpoint/2010/main" spd="slow" p14:dur="2000">
-        <p159:morph option="byObject"/>
-      </p:transition>
-    </mc:Choice>
-    <mc:Fallback xmlns="">
-      <p:transition spd="slow">
-        <p:fade/>
-      </p:transition>
-    </mc:Fallback>
-  </mc:AlternateContent>
+</p:sld>
+</file>
+
+<file path=ppt/slides/slide10.xml><?xml version="1.0" encoding="utf-8"?>
+<p:sld xmlns:a="http://schemas.openxmlformats.org/drawingml/2006/main" xmlns:r="http://schemas.openxmlformats.org/officeDocument/2006/relationships" xmlns:p="http://schemas.openxmlformats.org/presentationml/2006/main">
+  <p:cSld>
+    <p:spTree>
+      <p:nvGrpSpPr>
+        <p:cNvPr id="1" name=""/>
+        <p:cNvGrpSpPr/>
+        <p:nvPr/>
+      </p:nvGrpSpPr>
+      <p:grpSpPr>
+        <a:xfrm>
+          <a:off x="0" y="0"/>
+          <a:ext cx="0" cy="0"/>
+          <a:chOff x="0" y="0"/>
+          <a:chExt cx="0" cy="0"/>
+        </a:xfrm>
+      </p:grpSpPr>
+    </p:spTree>
+    <p:extLst>
+      <p:ext uri="{BB962C8B-B14F-4D97-AF65-F5344CB8AC3E}">
+        <p14:creationId xmlns:p14="http://schemas.microsoft.com/office/powerpoint/2010/main" val="3301748207"/>
+      </p:ext>
+    </p:extLst>
+  </p:cSld>
+  <p:clrMapOvr>
+    <a:masterClrMapping/>
+  </p:clrMapOvr>
+</p:sld>
+</file>
+
+<file path=ppt/slides/slide11.xml><?xml version="1.0" encoding="utf-8"?>
+<p:sld xmlns:a="http://schemas.openxmlformats.org/drawingml/2006/main" xmlns:r="http://schemas.openxmlformats.org/officeDocument/2006/relationships" xmlns:p="http://schemas.openxmlformats.org/presentationml/2006/main">
+  <p:cSld>
+    <p:spTree>
+      <p:nvGrpSpPr>
+        <p:cNvPr id="1" name=""/>
+        <p:cNvGrpSpPr/>
+        <p:nvPr/>
+      </p:nvGrpSpPr>
+      <p:grpSpPr>
+        <a:xfrm>
+          <a:off x="0" y="0"/>
+          <a:ext cx="0" cy="0"/>
+          <a:chOff x="0" y="0"/>
+          <a:chExt cx="0" cy="0"/>
+        </a:xfrm>
+      </p:grpSpPr>
+    </p:spTree>
+    <p:extLst>
+      <p:ext uri="{BB962C8B-B14F-4D97-AF65-F5344CB8AC3E}">
+        <p14:creationId xmlns:p14="http://schemas.microsoft.com/office/powerpoint/2010/main" val="673695611"/>
+      </p:ext>
+    </p:extLst>
+  </p:cSld>
+  <p:clrMapOvr>
+    <a:masterClrMapping/>
+  </p:clrMapOvr>
+</p:sld>
+</file>
+
+<file path=ppt/slides/slide12.xml><?xml version="1.0" encoding="utf-8"?>
+<p:sld xmlns:a="http://schemas.openxmlformats.org/drawingml/2006/main" xmlns:r="http://schemas.openxmlformats.org/officeDocument/2006/relationships" xmlns:p="http://schemas.openxmlformats.org/presentationml/2006/main">
+  <p:cSld>
+    <p:spTree>
+      <p:nvGrpSpPr>
+        <p:cNvPr id="1" name=""/>
+        <p:cNvGrpSpPr/>
+        <p:nvPr/>
+      </p:nvGrpSpPr>
+      <p:grpSpPr>
+        <a:xfrm>
+          <a:off x="0" y="0"/>
+          <a:ext cx="0" cy="0"/>
+          <a:chOff x="0" y="0"/>
+          <a:chExt cx="0" cy="0"/>
+        </a:xfrm>
+      </p:grpSpPr>
+    </p:spTree>
+    <p:extLst>
+      <p:ext uri="{BB962C8B-B14F-4D97-AF65-F5344CB8AC3E}">
+        <p14:creationId xmlns:p14="http://schemas.microsoft.com/office/powerpoint/2010/main" val="3769938621"/>
+      </p:ext>
+    </p:extLst>
+  </p:cSld>
+  <p:clrMapOvr>
+    <a:masterClrMapping/>
+  </p:clrMapOvr>
+</p:sld>
+</file>
+
+<file path=ppt/slides/slide13.xml><?xml version="1.0" encoding="utf-8"?>
+<p:sld xmlns:a="http://schemas.openxmlformats.org/drawingml/2006/main" xmlns:r="http://schemas.openxmlformats.org/officeDocument/2006/relationships" xmlns:p="http://schemas.openxmlformats.org/presentationml/2006/main">
+  <p:cSld>
+    <p:spTree>
+      <p:nvGrpSpPr>
+        <p:cNvPr id="1" name=""/>
+        <p:cNvGrpSpPr/>
+        <p:nvPr/>
+      </p:nvGrpSpPr>
+      <p:grpSpPr>
+        <a:xfrm>
+          <a:off x="0" y="0"/>
+          <a:ext cx="0" cy="0"/>
+          <a:chOff x="0" y="0"/>
+          <a:chExt cx="0" cy="0"/>
+        </a:xfrm>
+      </p:grpSpPr>
+    </p:spTree>
+    <p:extLst>
+      <p:ext uri="{BB962C8B-B14F-4D97-AF65-F5344CB8AC3E}">
+        <p14:creationId xmlns:p14="http://schemas.microsoft.com/office/powerpoint/2010/main" val="72177782"/>
+      </p:ext>
+    </p:extLst>
+  </p:cSld>
+  <p:clrMapOvr>
+    <a:masterClrMapping/>
+  </p:clrMapOvr>
+</p:sld>
+</file>
+
+<file path=ppt/slides/slide14.xml><?xml version="1.0" encoding="utf-8"?>
+<p:sld xmlns:a="http://schemas.openxmlformats.org/drawingml/2006/main" xmlns:r="http://schemas.openxmlformats.org/officeDocument/2006/relationships" xmlns:p="http://schemas.openxmlformats.org/presentationml/2006/main">
+  <p:cSld>
+    <p:spTree>
+      <p:nvGrpSpPr>
+        <p:cNvPr id="1" name=""/>
+        <p:cNvGrpSpPr/>
+        <p:nvPr/>
+      </p:nvGrpSpPr>
+      <p:grpSpPr>
+        <a:xfrm>
+          <a:off x="0" y="0"/>
+          <a:ext cx="0" cy="0"/>
+          <a:chOff x="0" y="0"/>
+          <a:chExt cx="0" cy="0"/>
+        </a:xfrm>
+      </p:grpSpPr>
+    </p:spTree>
+    <p:extLst>
+      <p:ext uri="{BB962C8B-B14F-4D97-AF65-F5344CB8AC3E}">
+        <p14:creationId xmlns:p14="http://schemas.microsoft.com/office/powerpoint/2010/main" val="2541003518"/>
+      </p:ext>
+    </p:extLst>
+  </p:cSld>
+  <p:clrMapOvr>
+    <a:masterClrMapping/>
+  </p:clrMapOvr>
+</p:sld>
+</file>
+
+<file path=ppt/slides/slide2.xml><?xml version="1.0" encoding="utf-8"?>
+<p:sld xmlns:a="http://schemas.openxmlformats.org/drawingml/2006/main" xmlns:r="http://schemas.openxmlformats.org/officeDocument/2006/relationships" xmlns:p="http://schemas.openxmlformats.org/presentationml/2006/main">
+  <p:cSld>
+    <p:spTree>
+      <p:nvGrpSpPr>
+        <p:cNvPr id="1" name=""/>
+        <p:cNvGrpSpPr/>
+        <p:nvPr/>
+      </p:nvGrpSpPr>
+      <p:grpSpPr>
+        <a:xfrm>
+          <a:off x="0" y="0"/>
+          <a:ext cx="0" cy="0"/>
+          <a:chOff x="0" y="0"/>
+          <a:chExt cx="0" cy="0"/>
+        </a:xfrm>
+      </p:grpSpPr>
+    </p:spTree>
+    <p:extLst>
+      <p:ext uri="{BB962C8B-B14F-4D97-AF65-F5344CB8AC3E}">
+        <p14:creationId xmlns:p14="http://schemas.microsoft.com/office/powerpoint/2010/main" val="1332332323"/>
+      </p:ext>
+    </p:extLst>
+  </p:cSld>
+  <p:clrMapOvr>
+    <a:masterClrMapping/>
+  </p:clrMapOvr>
+</p:sld>
+</file>
+
+<file path=ppt/slides/slide3.xml><?xml version="1.0" encoding="utf-8"?>
+<p:sld xmlns:a="http://schemas.openxmlformats.org/drawingml/2006/main" xmlns:r="http://schemas.openxmlformats.org/officeDocument/2006/relationships" xmlns:p="http://schemas.openxmlformats.org/presentationml/2006/main">
+  <p:cSld>
+    <p:spTree>
+      <p:nvGrpSpPr>
+        <p:cNvPr id="1" name=""/>
+        <p:cNvGrpSpPr/>
+        <p:nvPr/>
+      </p:nvGrpSpPr>
+      <p:grpSpPr>
+        <a:xfrm>
+          <a:off x="0" y="0"/>
+          <a:ext cx="0" cy="0"/>
+          <a:chOff x="0" y="0"/>
+          <a:chExt cx="0" cy="0"/>
+        </a:xfrm>
+      </p:grpSpPr>
+    </p:spTree>
+    <p:extLst>
+      <p:ext uri="{BB962C8B-B14F-4D97-AF65-F5344CB8AC3E}">
+        <p14:creationId xmlns:p14="http://schemas.microsoft.com/office/powerpoint/2010/main" val="1281500133"/>
+      </p:ext>
+    </p:extLst>
+  </p:cSld>
+  <p:clrMapOvr>
+    <a:masterClrMapping/>
+  </p:clrMapOvr>
+</p:sld>
+</file>
+
+<file path=ppt/slides/slide4.xml><?xml version="1.0" encoding="utf-8"?>
+<p:sld xmlns:a="http://schemas.openxmlformats.org/drawingml/2006/main" xmlns:r="http://schemas.openxmlformats.org/officeDocument/2006/relationships" xmlns:p="http://schemas.openxmlformats.org/presentationml/2006/main">
+  <p:cSld>
+    <p:spTree>
+      <p:nvGrpSpPr>
+        <p:cNvPr id="1" name=""/>
+        <p:cNvGrpSpPr/>
+        <p:nvPr/>
+      </p:nvGrpSpPr>
+      <p:grpSpPr>
+        <a:xfrm>
+          <a:off x="0" y="0"/>
+          <a:ext cx="0" cy="0"/>
+          <a:chOff x="0" y="0"/>
+          <a:chExt cx="0" cy="0"/>
+        </a:xfrm>
+      </p:grpSpPr>
+    </p:spTree>
+    <p:extLst>
+      <p:ext uri="{BB962C8B-B14F-4D97-AF65-F5344CB8AC3E}">
+        <p14:creationId xmlns:p14="http://schemas.microsoft.com/office/powerpoint/2010/main" val="3669727495"/>
+      </p:ext>
+    </p:extLst>
+  </p:cSld>
+  <p:clrMapOvr>
+    <a:masterClrMapping/>
+  </p:clrMapOvr>
+</p:sld>
+</file>
+
+<file path=ppt/slides/slide5.xml><?xml version="1.0" encoding="utf-8"?>
+<p:sld xmlns:a="http://schemas.openxmlformats.org/drawingml/2006/main" xmlns:r="http://schemas.openxmlformats.org/officeDocument/2006/relationships" xmlns:p="http://schemas.openxmlformats.org/presentationml/2006/main">
+  <p:cSld>
+    <p:spTree>
+      <p:nvGrpSpPr>
+        <p:cNvPr id="1" name=""/>
+        <p:cNvGrpSpPr/>
+        <p:nvPr/>
+      </p:nvGrpSpPr>
+      <p:grpSpPr>
+        <a:xfrm>
+          <a:off x="0" y="0"/>
+          <a:ext cx="0" cy="0"/>
+          <a:chOff x="0" y="0"/>
+          <a:chExt cx="0" cy="0"/>
+        </a:xfrm>
+      </p:grpSpPr>
+    </p:spTree>
+    <p:extLst>
+      <p:ext uri="{BB962C8B-B14F-4D97-AF65-F5344CB8AC3E}">
+        <p14:creationId xmlns:p14="http://schemas.microsoft.com/office/powerpoint/2010/main" val="2127072071"/>
+      </p:ext>
+    </p:extLst>
+  </p:cSld>
+  <p:clrMapOvr>
+    <a:masterClrMapping/>
+  </p:clrMapOvr>
+</p:sld>
+</file>
+
+<file path=ppt/slides/slide6.xml><?xml version="1.0" encoding="utf-8"?>
+<p:sld xmlns:a="http://schemas.openxmlformats.org/drawingml/2006/main" xmlns:r="http://schemas.openxmlformats.org/officeDocument/2006/relationships" xmlns:p="http://schemas.openxmlformats.org/presentationml/2006/main">
+  <p:cSld>
+    <p:spTree>
+      <p:nvGrpSpPr>
+        <p:cNvPr id="1" name=""/>
+        <p:cNvGrpSpPr/>
+        <p:nvPr/>
+      </p:nvGrpSpPr>
+      <p:grpSpPr>
+        <a:xfrm>
+          <a:off x="0" y="0"/>
+          <a:ext cx="0" cy="0"/>
+          <a:chOff x="0" y="0"/>
+          <a:chExt cx="0" cy="0"/>
+        </a:xfrm>
+      </p:grpSpPr>
+    </p:spTree>
+    <p:extLst>
+      <p:ext uri="{BB962C8B-B14F-4D97-AF65-F5344CB8AC3E}">
+        <p14:creationId xmlns:p14="http://schemas.microsoft.com/office/powerpoint/2010/main" val="2674086462"/>
+      </p:ext>
+    </p:extLst>
+  </p:cSld>
+  <p:clrMapOvr>
+    <a:masterClrMapping/>
+  </p:clrMapOvr>
+</p:sld>
+</file>
+
+<file path=ppt/slides/slide7.xml><?xml version="1.0" encoding="utf-8"?>
+<p:sld xmlns:a="http://schemas.openxmlformats.org/drawingml/2006/main" xmlns:r="http://schemas.openxmlformats.org/officeDocument/2006/relationships" xmlns:p="http://schemas.openxmlformats.org/presentationml/2006/main">
+  <p:cSld>
+    <p:spTree>
+      <p:nvGrpSpPr>
+        <p:cNvPr id="1" name=""/>
+        <p:cNvGrpSpPr/>
+        <p:nvPr/>
+      </p:nvGrpSpPr>
+      <p:grpSpPr>
+        <a:xfrm>
+          <a:off x="0" y="0"/>
+          <a:ext cx="0" cy="0"/>
+          <a:chOff x="0" y="0"/>
+          <a:chExt cx="0" cy="0"/>
+        </a:xfrm>
+      </p:grpSpPr>
+    </p:spTree>
+    <p:extLst>
+      <p:ext uri="{BB962C8B-B14F-4D97-AF65-F5344CB8AC3E}">
+        <p14:creationId xmlns:p14="http://schemas.microsoft.com/office/powerpoint/2010/main" val="3018050981"/>
+      </p:ext>
+    </p:extLst>
+  </p:cSld>
+  <p:clrMapOvr>
+    <a:masterClrMapping/>
+  </p:clrMapOvr>
+</p:sld>
+</file>
+
+<file path=ppt/slides/slide8.xml><?xml version="1.0" encoding="utf-8"?>
+<p:sld xmlns:a="http://schemas.openxmlformats.org/drawingml/2006/main" xmlns:r="http://schemas.openxmlformats.org/officeDocument/2006/relationships" xmlns:p="http://schemas.openxmlformats.org/presentationml/2006/main">
+  <p:cSld>
+    <p:spTree>
+      <p:nvGrpSpPr>
+        <p:cNvPr id="1" name=""/>
+        <p:cNvGrpSpPr/>
+        <p:nvPr/>
+      </p:nvGrpSpPr>
+      <p:grpSpPr>
+        <a:xfrm>
+          <a:off x="0" y="0"/>
+          <a:ext cx="0" cy="0"/>
+          <a:chOff x="0" y="0"/>
+          <a:chExt cx="0" cy="0"/>
+        </a:xfrm>
+      </p:grpSpPr>
+    </p:spTree>
+    <p:extLst>
+      <p:ext uri="{BB962C8B-B14F-4D97-AF65-F5344CB8AC3E}">
+        <p14:creationId xmlns:p14="http://schemas.microsoft.com/office/powerpoint/2010/main" val="58980988"/>
+      </p:ext>
+    </p:extLst>
+  </p:cSld>
+  <p:clrMapOvr>
+    <a:masterClrMapping/>
+  </p:clrMapOvr>
+</p:sld>
+</file>
+
+<file path=ppt/slides/slide9.xml><?xml version="1.0" encoding="utf-8"?>
+<p:sld xmlns:a="http://schemas.openxmlformats.org/drawingml/2006/main" xmlns:r="http://schemas.openxmlformats.org/officeDocument/2006/relationships" xmlns:p="http://schemas.openxmlformats.org/presentationml/2006/main">
+  <p:cSld>
+    <p:spTree>
+      <p:nvGrpSpPr>
+        <p:cNvPr id="1" name=""/>
+        <p:cNvGrpSpPr/>
+        <p:nvPr/>
+      </p:nvGrpSpPr>
+      <p:grpSpPr>
+        <a:xfrm>
+          <a:off x="0" y="0"/>
+          <a:ext cx="0" cy="0"/>
+          <a:chOff x="0" y="0"/>
+          <a:chExt cx="0" cy="0"/>
+        </a:xfrm>
+      </p:grpSpPr>
+    </p:spTree>
+    <p:extLst>
+      <p:ext uri="{BB962C8B-B14F-4D97-AF65-F5344CB8AC3E}">
+        <p14:creationId xmlns:p14="http://schemas.microsoft.com/office/powerpoint/2010/main" val="4190608569"/>
+      </p:ext>
+    </p:extLst>
+  </p:cSld>
+  <p:clrMapOvr>
+    <a:masterClrMapping/>
+  </p:clrMapOvr>
 </p:sld>
 </file>
 

</xml_diff>

<commit_message>
Vortrag - Vortragsskizze bereitgestellt.
</commit_message>
<xml_diff>
--- a/2-Entwurf/1-Phasenartefakt/Vortrag/Vortrag - Entwurf.pptx
+++ b/2-Entwurf/1-Phasenartefakt/Vortrag/Vortrag - Entwurf.pptx
@@ -19,6 +19,8 @@
     <p:sldId id="268" r:id="rId13"/>
     <p:sldId id="269" r:id="rId14"/>
     <p:sldId id="270" r:id="rId15"/>
+    <p:sldId id="271" r:id="rId16"/>
+    <p:sldId id="272" r:id="rId17"/>
   </p:sldIdLst>
   <p:sldSz cx="12192000" cy="6858000"/>
   <p:notesSz cx="6858000" cy="9144000"/>
@@ -3571,10 +3573,119 @@
           <a:chExt cx="0" cy="0"/>
         </a:xfrm>
       </p:grpSpPr>
+      <p:pic>
+        <p:nvPicPr>
+          <p:cNvPr id="3" name="Grafik 2">
+            <a:extLst>
+              <a:ext uri="{FF2B5EF4-FFF2-40B4-BE49-F238E27FC236}">
+                <a16:creationId xmlns:a16="http://schemas.microsoft.com/office/drawing/2014/main" id="{2E40DDCE-ADD9-455F-80A7-433C6BB4434C}"/>
+              </a:ext>
+            </a:extLst>
+          </p:cNvPr>
+          <p:cNvPicPr>
+            <a:picLocks noChangeAspect="1"/>
+          </p:cNvPicPr>
+          <p:nvPr/>
+        </p:nvPicPr>
+        <p:blipFill>
+          <a:blip r:embed="rId2">
+            <a:extLst>
+              <a:ext uri="{28A0092B-C50C-407E-A947-70E740481C1C}">
+                <a14:useLocalDpi xmlns:a14="http://schemas.microsoft.com/office/drawing/2010/main" val="0"/>
+              </a:ext>
+            </a:extLst>
+          </a:blip>
+          <a:stretch>
+            <a:fillRect/>
+          </a:stretch>
+        </p:blipFill>
+        <p:spPr>
+          <a:xfrm>
+            <a:off x="0" y="-11624"/>
+            <a:ext cx="12192000" cy="1104900"/>
+          </a:xfrm>
+          <a:prstGeom prst="rect">
+            <a:avLst/>
+          </a:prstGeom>
+        </p:spPr>
+      </p:pic>
+      <p:sp>
+        <p:nvSpPr>
+          <p:cNvPr id="4" name="Textfeld 3">
+            <a:extLst>
+              <a:ext uri="{FF2B5EF4-FFF2-40B4-BE49-F238E27FC236}">
+                <a16:creationId xmlns:a16="http://schemas.microsoft.com/office/drawing/2014/main" id="{CB834DB4-CE0C-4741-AD77-2FBC553F27DE}"/>
+              </a:ext>
+            </a:extLst>
+          </p:cNvPr>
+          <p:cNvSpPr txBox="1"/>
+          <p:nvPr/>
+        </p:nvSpPr>
+        <p:spPr>
+          <a:xfrm>
+            <a:off x="2417736" y="1276597"/>
+            <a:ext cx="7454684" cy="523220"/>
+          </a:xfrm>
+          <a:prstGeom prst="rect">
+            <a:avLst/>
+          </a:prstGeom>
+          <a:noFill/>
+        </p:spPr>
+        <p:txBody>
+          <a:bodyPr wrap="square" rtlCol="0">
+            <a:spAutoFit/>
+          </a:bodyPr>
+          <a:lstStyle/>
+          <a:p>
+            <a:pPr algn="ctr"/>
+            <a:r>
+              <a:rPr lang="de-DE" sz="2800" b="1" dirty="0"/>
+              <a:t>Direktkommunikation zwischen allen Klassen</a:t>
+            </a:r>
+            <a:endParaRPr lang="de-DE" sz="2800" dirty="0"/>
+          </a:p>
+        </p:txBody>
+      </p:sp>
+      <p:pic>
+        <p:nvPicPr>
+          <p:cNvPr id="5" name="Grafik 4" descr="Ein Bild, das Schild enthält.&#10;&#10;Mit hoher Zuverlässigkeit generierte Beschreibung">
+            <a:extLst>
+              <a:ext uri="{FF2B5EF4-FFF2-40B4-BE49-F238E27FC236}">
+                <a16:creationId xmlns:a16="http://schemas.microsoft.com/office/drawing/2014/main" id="{5CE3E5A5-D8BC-4691-8695-81E43BDE20ED}"/>
+              </a:ext>
+            </a:extLst>
+          </p:cNvPr>
+          <p:cNvPicPr>
+            <a:picLocks noChangeAspect="1"/>
+          </p:cNvPicPr>
+          <p:nvPr/>
+        </p:nvPicPr>
+        <p:blipFill>
+          <a:blip r:embed="rId3">
+            <a:extLst>
+              <a:ext uri="{28A0092B-C50C-407E-A947-70E740481C1C}">
+                <a14:useLocalDpi xmlns:a14="http://schemas.microsoft.com/office/drawing/2010/main" val="0"/>
+              </a:ext>
+            </a:extLst>
+          </a:blip>
+          <a:stretch>
+            <a:fillRect/>
+          </a:stretch>
+        </p:blipFill>
+        <p:spPr>
+          <a:xfrm>
+            <a:off x="4454149" y="2781709"/>
+            <a:ext cx="2876550" cy="2276475"/>
+          </a:xfrm>
+          <a:prstGeom prst="rect">
+            <a:avLst/>
+          </a:prstGeom>
+        </p:spPr>
+      </p:pic>
     </p:spTree>
     <p:extLst>
       <p:ext uri="{BB962C8B-B14F-4D97-AF65-F5344CB8AC3E}">
-        <p14:creationId xmlns:p14="http://schemas.microsoft.com/office/powerpoint/2010/main" val="3301748207"/>
+        <p14:creationId xmlns:p14="http://schemas.microsoft.com/office/powerpoint/2010/main" val="4069924963"/>
       </p:ext>
     </p:extLst>
   </p:cSld>
@@ -3601,10 +3712,83 @@
           <a:chExt cx="0" cy="0"/>
         </a:xfrm>
       </p:grpSpPr>
+      <p:pic>
+        <p:nvPicPr>
+          <p:cNvPr id="8" name="Grafik 7">
+            <a:extLst>
+              <a:ext uri="{FF2B5EF4-FFF2-40B4-BE49-F238E27FC236}">
+                <a16:creationId xmlns:a16="http://schemas.microsoft.com/office/drawing/2014/main" id="{83E8B718-28D6-431A-99B0-7A11F41324DF}"/>
+              </a:ext>
+            </a:extLst>
+          </p:cNvPr>
+          <p:cNvPicPr>
+            <a:picLocks noChangeAspect="1"/>
+          </p:cNvPicPr>
+          <p:nvPr/>
+        </p:nvPicPr>
+        <p:blipFill>
+          <a:blip r:embed="rId2">
+            <a:extLst>
+              <a:ext uri="{28A0092B-C50C-407E-A947-70E740481C1C}">
+                <a14:useLocalDpi xmlns:a14="http://schemas.microsoft.com/office/drawing/2010/main" val="0"/>
+              </a:ext>
+            </a:extLst>
+          </a:blip>
+          <a:stretch>
+            <a:fillRect/>
+          </a:stretch>
+        </p:blipFill>
+        <p:spPr>
+          <a:xfrm>
+            <a:off x="0" y="24822"/>
+            <a:ext cx="12192000" cy="6808356"/>
+          </a:xfrm>
+          <a:prstGeom prst="rect">
+            <a:avLst/>
+          </a:prstGeom>
+        </p:spPr>
+      </p:pic>
+      <p:sp>
+        <p:nvSpPr>
+          <p:cNvPr id="6" name="Textfeld 5">
+            <a:extLst>
+              <a:ext uri="{FF2B5EF4-FFF2-40B4-BE49-F238E27FC236}">
+                <a16:creationId xmlns:a16="http://schemas.microsoft.com/office/drawing/2014/main" id="{49B7B19A-E6BE-42A7-B82B-9CE5ED2AB38F}"/>
+              </a:ext>
+            </a:extLst>
+          </p:cNvPr>
+          <p:cNvSpPr txBox="1"/>
+          <p:nvPr/>
+        </p:nvSpPr>
+        <p:spPr>
+          <a:xfrm>
+            <a:off x="603504" y="3167390"/>
+            <a:ext cx="10125456" cy="954107"/>
+          </a:xfrm>
+          <a:prstGeom prst="rect">
+            <a:avLst/>
+          </a:prstGeom>
+          <a:noFill/>
+        </p:spPr>
+        <p:txBody>
+          <a:bodyPr wrap="square" rtlCol="0">
+            <a:spAutoFit/>
+          </a:bodyPr>
+          <a:lstStyle/>
+          <a:p>
+            <a:pPr algn="ctr"/>
+            <a:r>
+              <a:rPr lang="de-DE" sz="2800" b="1" dirty="0"/>
+              <a:t>Identifikation der Bausteine im Modell und in der Grafischen Benutzeroberfläche</a:t>
+            </a:r>
+            <a:endParaRPr lang="de-DE" sz="2800" dirty="0"/>
+          </a:p>
+        </p:txBody>
+      </p:sp>
     </p:spTree>
     <p:extLst>
       <p:ext uri="{BB962C8B-B14F-4D97-AF65-F5344CB8AC3E}">
-        <p14:creationId xmlns:p14="http://schemas.microsoft.com/office/powerpoint/2010/main" val="673695611"/>
+        <p14:creationId xmlns:p14="http://schemas.microsoft.com/office/powerpoint/2010/main" val="1956475057"/>
       </p:ext>
     </p:extLst>
   </p:cSld>
@@ -3631,10 +3815,119 @@
           <a:chExt cx="0" cy="0"/>
         </a:xfrm>
       </p:grpSpPr>
+      <p:pic>
+        <p:nvPicPr>
+          <p:cNvPr id="4" name="Grafik 3" descr="Ein Bild, das Objekt enthält.&#10;&#10;Mit hoher Zuverlässigkeit generierte Beschreibung">
+            <a:extLst>
+              <a:ext uri="{FF2B5EF4-FFF2-40B4-BE49-F238E27FC236}">
+                <a16:creationId xmlns:a16="http://schemas.microsoft.com/office/drawing/2014/main" id="{DCB59B41-2E20-4B4D-BE30-579B871C9419}"/>
+              </a:ext>
+            </a:extLst>
+          </p:cNvPr>
+          <p:cNvPicPr>
+            <a:picLocks noChangeAspect="1"/>
+          </p:cNvPicPr>
+          <p:nvPr/>
+        </p:nvPicPr>
+        <p:blipFill>
+          <a:blip r:embed="rId2">
+            <a:extLst>
+              <a:ext uri="{28A0092B-C50C-407E-A947-70E740481C1C}">
+                <a14:useLocalDpi xmlns:a14="http://schemas.microsoft.com/office/drawing/2010/main" val="0"/>
+              </a:ext>
+            </a:extLst>
+          </a:blip>
+          <a:stretch>
+            <a:fillRect/>
+          </a:stretch>
+        </p:blipFill>
+        <p:spPr>
+          <a:xfrm>
+            <a:off x="0" y="0"/>
+            <a:ext cx="12192000" cy="1104900"/>
+          </a:xfrm>
+          <a:prstGeom prst="rect">
+            <a:avLst/>
+          </a:prstGeom>
+        </p:spPr>
+      </p:pic>
+      <p:sp>
+        <p:nvSpPr>
+          <p:cNvPr id="3" name="Textfeld 2">
+            <a:extLst>
+              <a:ext uri="{FF2B5EF4-FFF2-40B4-BE49-F238E27FC236}">
+                <a16:creationId xmlns:a16="http://schemas.microsoft.com/office/drawing/2014/main" id="{3ECFA931-E775-43FA-8DF2-40BBAF82176F}"/>
+              </a:ext>
+            </a:extLst>
+          </p:cNvPr>
+          <p:cNvSpPr txBox="1"/>
+          <p:nvPr/>
+        </p:nvSpPr>
+        <p:spPr>
+          <a:xfrm>
+            <a:off x="3270142" y="1276597"/>
+            <a:ext cx="5269424" cy="523220"/>
+          </a:xfrm>
+          <a:prstGeom prst="rect">
+            <a:avLst/>
+          </a:prstGeom>
+          <a:noFill/>
+        </p:spPr>
+        <p:txBody>
+          <a:bodyPr wrap="square" rtlCol="0">
+            <a:spAutoFit/>
+          </a:bodyPr>
+          <a:lstStyle/>
+          <a:p>
+            <a:pPr algn="ctr"/>
+            <a:r>
+              <a:rPr lang="de-DE" sz="2800" b="1" dirty="0"/>
+              <a:t>Globales Verzeichnis</a:t>
+            </a:r>
+            <a:endParaRPr lang="de-DE" sz="2800" dirty="0"/>
+          </a:p>
+        </p:txBody>
+      </p:sp>
+      <p:pic>
+        <p:nvPicPr>
+          <p:cNvPr id="5" name="Grafik 4" descr="Ein Bild, das Schild enthält.&#10;&#10;Mit hoher Zuverlässigkeit generierte Beschreibung">
+            <a:extLst>
+              <a:ext uri="{FF2B5EF4-FFF2-40B4-BE49-F238E27FC236}">
+                <a16:creationId xmlns:a16="http://schemas.microsoft.com/office/drawing/2014/main" id="{E836074B-076B-4E8A-922B-83125C9BF5E4}"/>
+              </a:ext>
+            </a:extLst>
+          </p:cNvPr>
+          <p:cNvPicPr>
+            <a:picLocks noChangeAspect="1"/>
+          </p:cNvPicPr>
+          <p:nvPr/>
+        </p:nvPicPr>
+        <p:blipFill>
+          <a:blip r:embed="rId3">
+            <a:extLst>
+              <a:ext uri="{28A0092B-C50C-407E-A947-70E740481C1C}">
+                <a14:useLocalDpi xmlns:a14="http://schemas.microsoft.com/office/drawing/2010/main" val="0"/>
+              </a:ext>
+            </a:extLst>
+          </a:blip>
+          <a:stretch>
+            <a:fillRect/>
+          </a:stretch>
+        </p:blipFill>
+        <p:spPr>
+          <a:xfrm>
+            <a:off x="4454149" y="2781709"/>
+            <a:ext cx="2876550" cy="2276475"/>
+          </a:xfrm>
+          <a:prstGeom prst="rect">
+            <a:avLst/>
+          </a:prstGeom>
+        </p:spPr>
+      </p:pic>
     </p:spTree>
     <p:extLst>
       <p:ext uri="{BB962C8B-B14F-4D97-AF65-F5344CB8AC3E}">
-        <p14:creationId xmlns:p14="http://schemas.microsoft.com/office/powerpoint/2010/main" val="3769938621"/>
+        <p14:creationId xmlns:p14="http://schemas.microsoft.com/office/powerpoint/2010/main" val="1154292920"/>
       </p:ext>
     </p:extLst>
   </p:cSld>
@@ -3661,10 +3954,119 @@
           <a:chExt cx="0" cy="0"/>
         </a:xfrm>
       </p:grpSpPr>
+      <p:pic>
+        <p:nvPicPr>
+          <p:cNvPr id="3" name="Grafik 2">
+            <a:extLst>
+              <a:ext uri="{FF2B5EF4-FFF2-40B4-BE49-F238E27FC236}">
+                <a16:creationId xmlns:a16="http://schemas.microsoft.com/office/drawing/2014/main" id="{2E40DDCE-ADD9-455F-80A7-433C6BB4434C}"/>
+              </a:ext>
+            </a:extLst>
+          </p:cNvPr>
+          <p:cNvPicPr>
+            <a:picLocks noChangeAspect="1"/>
+          </p:cNvPicPr>
+          <p:nvPr/>
+        </p:nvPicPr>
+        <p:blipFill>
+          <a:blip r:embed="rId2">
+            <a:extLst>
+              <a:ext uri="{28A0092B-C50C-407E-A947-70E740481C1C}">
+                <a14:useLocalDpi xmlns:a14="http://schemas.microsoft.com/office/drawing/2010/main" val="0"/>
+              </a:ext>
+            </a:extLst>
+          </a:blip>
+          <a:stretch>
+            <a:fillRect/>
+          </a:stretch>
+        </p:blipFill>
+        <p:spPr>
+          <a:xfrm>
+            <a:off x="0" y="-11624"/>
+            <a:ext cx="12192000" cy="1104900"/>
+          </a:xfrm>
+          <a:prstGeom prst="rect">
+            <a:avLst/>
+          </a:prstGeom>
+        </p:spPr>
+      </p:pic>
+      <p:sp>
+        <p:nvSpPr>
+          <p:cNvPr id="4" name="Textfeld 3">
+            <a:extLst>
+              <a:ext uri="{FF2B5EF4-FFF2-40B4-BE49-F238E27FC236}">
+                <a16:creationId xmlns:a16="http://schemas.microsoft.com/office/drawing/2014/main" id="{28547776-EE3F-4D63-AA31-75DA61E02E2E}"/>
+              </a:ext>
+            </a:extLst>
+          </p:cNvPr>
+          <p:cNvSpPr txBox="1"/>
+          <p:nvPr/>
+        </p:nvSpPr>
+        <p:spPr>
+          <a:xfrm>
+            <a:off x="2231756" y="1276597"/>
+            <a:ext cx="6648773" cy="523220"/>
+          </a:xfrm>
+          <a:prstGeom prst="rect">
+            <a:avLst/>
+          </a:prstGeom>
+          <a:noFill/>
+        </p:spPr>
+        <p:txBody>
+          <a:bodyPr wrap="square" rtlCol="0">
+            <a:spAutoFit/>
+          </a:bodyPr>
+          <a:lstStyle/>
+          <a:p>
+            <a:pPr algn="ctr"/>
+            <a:r>
+              <a:rPr lang="de-DE" sz="2800" b="1" dirty="0"/>
+              <a:t>Serialisierte Identifikation</a:t>
+            </a:r>
+            <a:endParaRPr lang="de-DE" sz="2800" dirty="0"/>
+          </a:p>
+        </p:txBody>
+      </p:sp>
+      <p:pic>
+        <p:nvPicPr>
+          <p:cNvPr id="5" name="Grafik 4" descr="Ein Bild, das Schild enthält.&#10;&#10;Mit hoher Zuverlässigkeit generierte Beschreibung">
+            <a:extLst>
+              <a:ext uri="{FF2B5EF4-FFF2-40B4-BE49-F238E27FC236}">
+                <a16:creationId xmlns:a16="http://schemas.microsoft.com/office/drawing/2014/main" id="{666C013C-011B-4664-BD3C-71BB41B87844}"/>
+              </a:ext>
+            </a:extLst>
+          </p:cNvPr>
+          <p:cNvPicPr>
+            <a:picLocks noChangeAspect="1"/>
+          </p:cNvPicPr>
+          <p:nvPr/>
+        </p:nvPicPr>
+        <p:blipFill>
+          <a:blip r:embed="rId3">
+            <a:extLst>
+              <a:ext uri="{28A0092B-C50C-407E-A947-70E740481C1C}">
+                <a14:useLocalDpi xmlns:a14="http://schemas.microsoft.com/office/drawing/2010/main" val="0"/>
+              </a:ext>
+            </a:extLst>
+          </a:blip>
+          <a:stretch>
+            <a:fillRect/>
+          </a:stretch>
+        </p:blipFill>
+        <p:spPr>
+          <a:xfrm>
+            <a:off x="4454149" y="2781709"/>
+            <a:ext cx="2876550" cy="2276475"/>
+          </a:xfrm>
+          <a:prstGeom prst="rect">
+            <a:avLst/>
+          </a:prstGeom>
+        </p:spPr>
+      </p:pic>
     </p:spTree>
     <p:extLst>
       <p:ext uri="{BB962C8B-B14F-4D97-AF65-F5344CB8AC3E}">
-        <p14:creationId xmlns:p14="http://schemas.microsoft.com/office/powerpoint/2010/main" val="72177782"/>
+        <p14:creationId xmlns:p14="http://schemas.microsoft.com/office/powerpoint/2010/main" val="1482457726"/>
       </p:ext>
     </p:extLst>
   </p:cSld>
@@ -3691,10 +4093,369 @@
           <a:chExt cx="0" cy="0"/>
         </a:xfrm>
       </p:grpSpPr>
+      <p:pic>
+        <p:nvPicPr>
+          <p:cNvPr id="8" name="Grafik 7">
+            <a:extLst>
+              <a:ext uri="{FF2B5EF4-FFF2-40B4-BE49-F238E27FC236}">
+                <a16:creationId xmlns:a16="http://schemas.microsoft.com/office/drawing/2014/main" id="{83E8B718-28D6-431A-99B0-7A11F41324DF}"/>
+              </a:ext>
+            </a:extLst>
+          </p:cNvPr>
+          <p:cNvPicPr>
+            <a:picLocks noChangeAspect="1"/>
+          </p:cNvPicPr>
+          <p:nvPr/>
+        </p:nvPicPr>
+        <p:blipFill>
+          <a:blip r:embed="rId2">
+            <a:extLst>
+              <a:ext uri="{28A0092B-C50C-407E-A947-70E740481C1C}">
+                <a14:useLocalDpi xmlns:a14="http://schemas.microsoft.com/office/drawing/2010/main" val="0"/>
+              </a:ext>
+            </a:extLst>
+          </a:blip>
+          <a:stretch>
+            <a:fillRect/>
+          </a:stretch>
+        </p:blipFill>
+        <p:spPr>
+          <a:xfrm>
+            <a:off x="0" y="24822"/>
+            <a:ext cx="12192000" cy="6808356"/>
+          </a:xfrm>
+          <a:prstGeom prst="rect">
+            <a:avLst/>
+          </a:prstGeom>
+        </p:spPr>
+      </p:pic>
+      <p:sp>
+        <p:nvSpPr>
+          <p:cNvPr id="6" name="Textfeld 5">
+            <a:extLst>
+              <a:ext uri="{FF2B5EF4-FFF2-40B4-BE49-F238E27FC236}">
+                <a16:creationId xmlns:a16="http://schemas.microsoft.com/office/drawing/2014/main" id="{49B7B19A-E6BE-42A7-B82B-9CE5ED2AB38F}"/>
+              </a:ext>
+            </a:extLst>
+          </p:cNvPr>
+          <p:cNvSpPr txBox="1"/>
+          <p:nvPr/>
+        </p:nvSpPr>
+        <p:spPr>
+          <a:xfrm>
+            <a:off x="603504" y="3167390"/>
+            <a:ext cx="10125456" cy="954107"/>
+          </a:xfrm>
+          <a:prstGeom prst="rect">
+            <a:avLst/>
+          </a:prstGeom>
+          <a:noFill/>
+        </p:spPr>
+        <p:txBody>
+          <a:bodyPr wrap="square" rtlCol="0">
+            <a:spAutoFit/>
+          </a:bodyPr>
+          <a:lstStyle/>
+          <a:p>
+            <a:pPr algn="ctr"/>
+            <a:r>
+              <a:rPr lang="de-DE" sz="2800" b="1" dirty="0"/>
+              <a:t>Ablage von erstellten Mess-Konfigurationen, Bausteinen und Messdaten</a:t>
+            </a:r>
+            <a:endParaRPr lang="de-DE" sz="2800" dirty="0"/>
+          </a:p>
+        </p:txBody>
+      </p:sp>
     </p:spTree>
     <p:extLst>
       <p:ext uri="{BB962C8B-B14F-4D97-AF65-F5344CB8AC3E}">
-        <p14:creationId xmlns:p14="http://schemas.microsoft.com/office/powerpoint/2010/main" val="2541003518"/>
+        <p14:creationId xmlns:p14="http://schemas.microsoft.com/office/powerpoint/2010/main" val="337206942"/>
+      </p:ext>
+    </p:extLst>
+  </p:cSld>
+  <p:clrMapOvr>
+    <a:masterClrMapping/>
+  </p:clrMapOvr>
+</p:sld>
+</file>
+
+<file path=ppt/slides/slide15.xml><?xml version="1.0" encoding="utf-8"?>
+<p:sld xmlns:a="http://schemas.openxmlformats.org/drawingml/2006/main" xmlns:r="http://schemas.openxmlformats.org/officeDocument/2006/relationships" xmlns:p="http://schemas.openxmlformats.org/presentationml/2006/main">
+  <p:cSld>
+    <p:spTree>
+      <p:nvGrpSpPr>
+        <p:cNvPr id="1" name=""/>
+        <p:cNvGrpSpPr/>
+        <p:nvPr/>
+      </p:nvGrpSpPr>
+      <p:grpSpPr>
+        <a:xfrm>
+          <a:off x="0" y="0"/>
+          <a:ext cx="0" cy="0"/>
+          <a:chOff x="0" y="0"/>
+          <a:chExt cx="0" cy="0"/>
+        </a:xfrm>
+      </p:grpSpPr>
+      <p:pic>
+        <p:nvPicPr>
+          <p:cNvPr id="4" name="Grafik 3" descr="Ein Bild, das Objekt enthält.&#10;&#10;Mit hoher Zuverlässigkeit generierte Beschreibung">
+            <a:extLst>
+              <a:ext uri="{FF2B5EF4-FFF2-40B4-BE49-F238E27FC236}">
+                <a16:creationId xmlns:a16="http://schemas.microsoft.com/office/drawing/2014/main" id="{DCB59B41-2E20-4B4D-BE30-579B871C9419}"/>
+              </a:ext>
+            </a:extLst>
+          </p:cNvPr>
+          <p:cNvPicPr>
+            <a:picLocks noChangeAspect="1"/>
+          </p:cNvPicPr>
+          <p:nvPr/>
+        </p:nvPicPr>
+        <p:blipFill>
+          <a:blip r:embed="rId2">
+            <a:extLst>
+              <a:ext uri="{28A0092B-C50C-407E-A947-70E740481C1C}">
+                <a14:useLocalDpi xmlns:a14="http://schemas.microsoft.com/office/drawing/2010/main" val="0"/>
+              </a:ext>
+            </a:extLst>
+          </a:blip>
+          <a:stretch>
+            <a:fillRect/>
+          </a:stretch>
+        </p:blipFill>
+        <p:spPr>
+          <a:xfrm>
+            <a:off x="0" y="0"/>
+            <a:ext cx="12192000" cy="1104900"/>
+          </a:xfrm>
+          <a:prstGeom prst="rect">
+            <a:avLst/>
+          </a:prstGeom>
+        </p:spPr>
+      </p:pic>
+      <p:sp>
+        <p:nvSpPr>
+          <p:cNvPr id="3" name="Textfeld 2">
+            <a:extLst>
+              <a:ext uri="{FF2B5EF4-FFF2-40B4-BE49-F238E27FC236}">
+                <a16:creationId xmlns:a16="http://schemas.microsoft.com/office/drawing/2014/main" id="{77209D7A-E4EE-4745-B0AB-56624E22A7FD}"/>
+              </a:ext>
+            </a:extLst>
+          </p:cNvPr>
+          <p:cNvSpPr txBox="1"/>
+          <p:nvPr/>
+        </p:nvSpPr>
+        <p:spPr>
+          <a:xfrm>
+            <a:off x="2185261" y="1276597"/>
+            <a:ext cx="6927742" cy="523220"/>
+          </a:xfrm>
+          <a:prstGeom prst="rect">
+            <a:avLst/>
+          </a:prstGeom>
+          <a:noFill/>
+        </p:spPr>
+        <p:txBody>
+          <a:bodyPr wrap="square" rtlCol="0">
+            <a:spAutoFit/>
+          </a:bodyPr>
+          <a:lstStyle/>
+          <a:p>
+            <a:pPr algn="ctr"/>
+            <a:r>
+              <a:rPr lang="en-US" sz="2800" b="1" dirty="0" err="1"/>
+              <a:t>Daten</a:t>
+            </a:r>
+            <a:r>
+              <a:rPr lang="en-US" sz="2800" b="1" dirty="0"/>
+              <a:t> </a:t>
+            </a:r>
+            <a:r>
+              <a:rPr lang="en-US" sz="2800" b="1" dirty="0" err="1"/>
+              <a:t>Verarbeitungsdienst</a:t>
+            </a:r>
+            <a:endParaRPr lang="de-DE" sz="2800" dirty="0"/>
+          </a:p>
+        </p:txBody>
+      </p:sp>
+      <p:pic>
+        <p:nvPicPr>
+          <p:cNvPr id="5" name="Grafik 4" descr="Ein Bild, das Schild enthält.&#10;&#10;Mit hoher Zuverlässigkeit generierte Beschreibung">
+            <a:extLst>
+              <a:ext uri="{FF2B5EF4-FFF2-40B4-BE49-F238E27FC236}">
+                <a16:creationId xmlns:a16="http://schemas.microsoft.com/office/drawing/2014/main" id="{A45FE69C-0AEA-47F0-8B1C-FCDFDD54C6AB}"/>
+              </a:ext>
+            </a:extLst>
+          </p:cNvPr>
+          <p:cNvPicPr>
+            <a:picLocks noChangeAspect="1"/>
+          </p:cNvPicPr>
+          <p:nvPr/>
+        </p:nvPicPr>
+        <p:blipFill>
+          <a:blip r:embed="rId3">
+            <a:extLst>
+              <a:ext uri="{28A0092B-C50C-407E-A947-70E740481C1C}">
+                <a14:useLocalDpi xmlns:a14="http://schemas.microsoft.com/office/drawing/2010/main" val="0"/>
+              </a:ext>
+            </a:extLst>
+          </a:blip>
+          <a:stretch>
+            <a:fillRect/>
+          </a:stretch>
+        </p:blipFill>
+        <p:spPr>
+          <a:xfrm>
+            <a:off x="4454149" y="2781709"/>
+            <a:ext cx="2876550" cy="2276475"/>
+          </a:xfrm>
+          <a:prstGeom prst="rect">
+            <a:avLst/>
+          </a:prstGeom>
+        </p:spPr>
+      </p:pic>
+    </p:spTree>
+    <p:extLst>
+      <p:ext uri="{BB962C8B-B14F-4D97-AF65-F5344CB8AC3E}">
+        <p14:creationId xmlns:p14="http://schemas.microsoft.com/office/powerpoint/2010/main" val="1862015763"/>
+      </p:ext>
+    </p:extLst>
+  </p:cSld>
+  <p:clrMapOvr>
+    <a:masterClrMapping/>
+  </p:clrMapOvr>
+</p:sld>
+</file>
+
+<file path=ppt/slides/slide16.xml><?xml version="1.0" encoding="utf-8"?>
+<p:sld xmlns:a="http://schemas.openxmlformats.org/drawingml/2006/main" xmlns:r="http://schemas.openxmlformats.org/officeDocument/2006/relationships" xmlns:p="http://schemas.openxmlformats.org/presentationml/2006/main">
+  <p:cSld>
+    <p:spTree>
+      <p:nvGrpSpPr>
+        <p:cNvPr id="1" name=""/>
+        <p:cNvGrpSpPr/>
+        <p:nvPr/>
+      </p:nvGrpSpPr>
+      <p:grpSpPr>
+        <a:xfrm>
+          <a:off x="0" y="0"/>
+          <a:ext cx="0" cy="0"/>
+          <a:chOff x="0" y="0"/>
+          <a:chExt cx="0" cy="0"/>
+        </a:xfrm>
+      </p:grpSpPr>
+      <p:pic>
+        <p:nvPicPr>
+          <p:cNvPr id="3" name="Grafik 2">
+            <a:extLst>
+              <a:ext uri="{FF2B5EF4-FFF2-40B4-BE49-F238E27FC236}">
+                <a16:creationId xmlns:a16="http://schemas.microsoft.com/office/drawing/2014/main" id="{2E40DDCE-ADD9-455F-80A7-433C6BB4434C}"/>
+              </a:ext>
+            </a:extLst>
+          </p:cNvPr>
+          <p:cNvPicPr>
+            <a:picLocks noChangeAspect="1"/>
+          </p:cNvPicPr>
+          <p:nvPr/>
+        </p:nvPicPr>
+        <p:blipFill>
+          <a:blip r:embed="rId2">
+            <a:extLst>
+              <a:ext uri="{28A0092B-C50C-407E-A947-70E740481C1C}">
+                <a14:useLocalDpi xmlns:a14="http://schemas.microsoft.com/office/drawing/2010/main" val="0"/>
+              </a:ext>
+            </a:extLst>
+          </a:blip>
+          <a:stretch>
+            <a:fillRect/>
+          </a:stretch>
+        </p:blipFill>
+        <p:spPr>
+          <a:xfrm>
+            <a:off x="0" y="-11624"/>
+            <a:ext cx="12192000" cy="1104900"/>
+          </a:xfrm>
+          <a:prstGeom prst="rect">
+            <a:avLst/>
+          </a:prstGeom>
+        </p:spPr>
+      </p:pic>
+      <p:sp>
+        <p:nvSpPr>
+          <p:cNvPr id="4" name="Textfeld 3">
+            <a:extLst>
+              <a:ext uri="{FF2B5EF4-FFF2-40B4-BE49-F238E27FC236}">
+                <a16:creationId xmlns:a16="http://schemas.microsoft.com/office/drawing/2014/main" id="{D6E28B95-0613-4BB2-8904-43CEFACA5DF0}"/>
+              </a:ext>
+            </a:extLst>
+          </p:cNvPr>
+          <p:cNvSpPr txBox="1"/>
+          <p:nvPr/>
+        </p:nvSpPr>
+        <p:spPr>
+          <a:xfrm>
+            <a:off x="3130658" y="1276597"/>
+            <a:ext cx="5827362" cy="523220"/>
+          </a:xfrm>
+          <a:prstGeom prst="rect">
+            <a:avLst/>
+          </a:prstGeom>
+          <a:noFill/>
+        </p:spPr>
+        <p:txBody>
+          <a:bodyPr wrap="square" rtlCol="0">
+            <a:spAutoFit/>
+          </a:bodyPr>
+          <a:lstStyle/>
+          <a:p>
+            <a:pPr algn="ctr"/>
+            <a:r>
+              <a:rPr lang="de-DE" sz="2800" b="1" dirty="0"/>
+              <a:t>Angepasste Dateiformate</a:t>
+            </a:r>
+            <a:endParaRPr lang="de-DE" sz="2800" dirty="0"/>
+          </a:p>
+        </p:txBody>
+      </p:sp>
+      <p:pic>
+        <p:nvPicPr>
+          <p:cNvPr id="5" name="Grafik 4" descr="Ein Bild, das Schild enthält.&#10;&#10;Mit hoher Zuverlässigkeit generierte Beschreibung">
+            <a:extLst>
+              <a:ext uri="{FF2B5EF4-FFF2-40B4-BE49-F238E27FC236}">
+                <a16:creationId xmlns:a16="http://schemas.microsoft.com/office/drawing/2014/main" id="{1C3C8C94-6302-4E9F-BF6F-9AC28A88D54C}"/>
+              </a:ext>
+            </a:extLst>
+          </p:cNvPr>
+          <p:cNvPicPr>
+            <a:picLocks noChangeAspect="1"/>
+          </p:cNvPicPr>
+          <p:nvPr/>
+        </p:nvPicPr>
+        <p:blipFill>
+          <a:blip r:embed="rId3">
+            <a:extLst>
+              <a:ext uri="{28A0092B-C50C-407E-A947-70E740481C1C}">
+                <a14:useLocalDpi xmlns:a14="http://schemas.microsoft.com/office/drawing/2010/main" val="0"/>
+              </a:ext>
+            </a:extLst>
+          </a:blip>
+          <a:stretch>
+            <a:fillRect/>
+          </a:stretch>
+        </p:blipFill>
+        <p:spPr>
+          <a:xfrm>
+            <a:off x="4454149" y="2781709"/>
+            <a:ext cx="2876550" cy="2276475"/>
+          </a:xfrm>
+          <a:prstGeom prst="rect">
+            <a:avLst/>
+          </a:prstGeom>
+        </p:spPr>
+      </p:pic>
+    </p:spTree>
+    <p:extLst>
+      <p:ext uri="{BB962C8B-B14F-4D97-AF65-F5344CB8AC3E}">
+        <p14:creationId xmlns:p14="http://schemas.microsoft.com/office/powerpoint/2010/main" val="2378291138"/>
       </p:ext>
     </p:extLst>
   </p:cSld>
@@ -3721,6 +4482,87 @@
           <a:chExt cx="0" cy="0"/>
         </a:xfrm>
       </p:grpSpPr>
+      <p:pic>
+        <p:nvPicPr>
+          <p:cNvPr id="8" name="Grafik 7">
+            <a:extLst>
+              <a:ext uri="{FF2B5EF4-FFF2-40B4-BE49-F238E27FC236}">
+                <a16:creationId xmlns:a16="http://schemas.microsoft.com/office/drawing/2014/main" id="{83E8B718-28D6-431A-99B0-7A11F41324DF}"/>
+              </a:ext>
+            </a:extLst>
+          </p:cNvPr>
+          <p:cNvPicPr>
+            <a:picLocks noChangeAspect="1"/>
+          </p:cNvPicPr>
+          <p:nvPr/>
+        </p:nvPicPr>
+        <p:blipFill>
+          <a:blip r:embed="rId2">
+            <a:extLst>
+              <a:ext uri="{28A0092B-C50C-407E-A947-70E740481C1C}">
+                <a14:useLocalDpi xmlns:a14="http://schemas.microsoft.com/office/drawing/2010/main" val="0"/>
+              </a:ext>
+            </a:extLst>
+          </a:blip>
+          <a:stretch>
+            <a:fillRect/>
+          </a:stretch>
+        </p:blipFill>
+        <p:spPr>
+          <a:xfrm>
+            <a:off x="0" y="24822"/>
+            <a:ext cx="12192000" cy="6808356"/>
+          </a:xfrm>
+          <a:prstGeom prst="rect">
+            <a:avLst/>
+          </a:prstGeom>
+        </p:spPr>
+      </p:pic>
+      <p:sp>
+        <p:nvSpPr>
+          <p:cNvPr id="6" name="Textfeld 5">
+            <a:extLst>
+              <a:ext uri="{FF2B5EF4-FFF2-40B4-BE49-F238E27FC236}">
+                <a16:creationId xmlns:a16="http://schemas.microsoft.com/office/drawing/2014/main" id="{49B7B19A-E6BE-42A7-B82B-9CE5ED2AB38F}"/>
+              </a:ext>
+            </a:extLst>
+          </p:cNvPr>
+          <p:cNvSpPr txBox="1"/>
+          <p:nvPr/>
+        </p:nvSpPr>
+        <p:spPr>
+          <a:xfrm>
+            <a:off x="603504" y="3167390"/>
+            <a:ext cx="10125456" cy="523220"/>
+          </a:xfrm>
+          <a:prstGeom prst="rect">
+            <a:avLst/>
+          </a:prstGeom>
+          <a:noFill/>
+        </p:spPr>
+        <p:txBody>
+          <a:bodyPr wrap="square" rtlCol="0">
+            <a:spAutoFit/>
+          </a:bodyPr>
+          <a:lstStyle/>
+          <a:p>
+            <a:pPr algn="r"/>
+            <a:r>
+              <a:rPr lang="de-DE" sz="2800" b="1" dirty="0"/>
+              <a:t>Daten vom </a:t>
+            </a:r>
+            <a:r>
+              <a:rPr lang="de-DE" sz="2800" b="1" dirty="0" err="1"/>
+              <a:t>RaspberryPi</a:t>
+            </a:r>
+            <a:r>
+              <a:rPr lang="de-DE" sz="2800" b="1" dirty="0"/>
+              <a:t> zu unserer Anwendung übertragen</a:t>
+            </a:r>
+            <a:endParaRPr lang="de-DE" sz="2800" dirty="0"/>
+          </a:p>
+        </p:txBody>
+      </p:sp>
     </p:spTree>
     <p:extLst>
       <p:ext uri="{BB962C8B-B14F-4D97-AF65-F5344CB8AC3E}">
@@ -3751,6 +4593,115 @@
           <a:chExt cx="0" cy="0"/>
         </a:xfrm>
       </p:grpSpPr>
+      <p:pic>
+        <p:nvPicPr>
+          <p:cNvPr id="4" name="Grafik 3" descr="Ein Bild, das Objekt enthält.&#10;&#10;Mit hoher Zuverlässigkeit generierte Beschreibung">
+            <a:extLst>
+              <a:ext uri="{FF2B5EF4-FFF2-40B4-BE49-F238E27FC236}">
+                <a16:creationId xmlns:a16="http://schemas.microsoft.com/office/drawing/2014/main" id="{DCB59B41-2E20-4B4D-BE30-579B871C9419}"/>
+              </a:ext>
+            </a:extLst>
+          </p:cNvPr>
+          <p:cNvPicPr>
+            <a:picLocks noChangeAspect="1"/>
+          </p:cNvPicPr>
+          <p:nvPr/>
+        </p:nvPicPr>
+        <p:blipFill>
+          <a:blip r:embed="rId2">
+            <a:extLst>
+              <a:ext uri="{28A0092B-C50C-407E-A947-70E740481C1C}">
+                <a14:useLocalDpi xmlns:a14="http://schemas.microsoft.com/office/drawing/2010/main" val="0"/>
+              </a:ext>
+            </a:extLst>
+          </a:blip>
+          <a:stretch>
+            <a:fillRect/>
+          </a:stretch>
+        </p:blipFill>
+        <p:spPr>
+          <a:xfrm>
+            <a:off x="0" y="0"/>
+            <a:ext cx="12192000" cy="1104900"/>
+          </a:xfrm>
+          <a:prstGeom prst="rect">
+            <a:avLst/>
+          </a:prstGeom>
+        </p:spPr>
+      </p:pic>
+      <p:sp>
+        <p:nvSpPr>
+          <p:cNvPr id="5" name="Textfeld 4">
+            <a:extLst>
+              <a:ext uri="{FF2B5EF4-FFF2-40B4-BE49-F238E27FC236}">
+                <a16:creationId xmlns:a16="http://schemas.microsoft.com/office/drawing/2014/main" id="{C04C7646-5FCE-44DD-86B9-A6EAD5D74CDB}"/>
+              </a:ext>
+            </a:extLst>
+          </p:cNvPr>
+          <p:cNvSpPr txBox="1"/>
+          <p:nvPr/>
+        </p:nvSpPr>
+        <p:spPr>
+          <a:xfrm>
+            <a:off x="4524575" y="1276597"/>
+            <a:ext cx="2806124" cy="523220"/>
+          </a:xfrm>
+          <a:prstGeom prst="rect">
+            <a:avLst/>
+          </a:prstGeom>
+          <a:noFill/>
+        </p:spPr>
+        <p:txBody>
+          <a:bodyPr wrap="square" rtlCol="0">
+            <a:spAutoFit/>
+          </a:bodyPr>
+          <a:lstStyle/>
+          <a:p>
+            <a:pPr algn="ctr"/>
+            <a:r>
+              <a:rPr lang="de-DE" sz="2800" b="1" dirty="0"/>
+              <a:t>Abstrakte Fabrik</a:t>
+            </a:r>
+            <a:endParaRPr lang="de-DE" sz="2800" dirty="0"/>
+          </a:p>
+        </p:txBody>
+      </p:sp>
+      <p:pic>
+        <p:nvPicPr>
+          <p:cNvPr id="7" name="Grafik 6" descr="Ein Bild, das Schild enthält.&#10;&#10;Mit hoher Zuverlässigkeit generierte Beschreibung">
+            <a:extLst>
+              <a:ext uri="{FF2B5EF4-FFF2-40B4-BE49-F238E27FC236}">
+                <a16:creationId xmlns:a16="http://schemas.microsoft.com/office/drawing/2014/main" id="{002B7BDA-041C-41EF-BDC5-7EBAE8E64301}"/>
+              </a:ext>
+            </a:extLst>
+          </p:cNvPr>
+          <p:cNvPicPr>
+            <a:picLocks noChangeAspect="1"/>
+          </p:cNvPicPr>
+          <p:nvPr/>
+        </p:nvPicPr>
+        <p:blipFill>
+          <a:blip r:embed="rId3">
+            <a:extLst>
+              <a:ext uri="{28A0092B-C50C-407E-A947-70E740481C1C}">
+                <a14:useLocalDpi xmlns:a14="http://schemas.microsoft.com/office/drawing/2010/main" val="0"/>
+              </a:ext>
+            </a:extLst>
+          </a:blip>
+          <a:stretch>
+            <a:fillRect/>
+          </a:stretch>
+        </p:blipFill>
+        <p:spPr>
+          <a:xfrm>
+            <a:off x="4454149" y="2781709"/>
+            <a:ext cx="2876550" cy="2276475"/>
+          </a:xfrm>
+          <a:prstGeom prst="rect">
+            <a:avLst/>
+          </a:prstGeom>
+        </p:spPr>
+      </p:pic>
     </p:spTree>
     <p:extLst>
       <p:ext uri="{BB962C8B-B14F-4D97-AF65-F5344CB8AC3E}">
@@ -3781,6 +4732,115 @@
           <a:chExt cx="0" cy="0"/>
         </a:xfrm>
       </p:grpSpPr>
+      <p:pic>
+        <p:nvPicPr>
+          <p:cNvPr id="3" name="Grafik 2">
+            <a:extLst>
+              <a:ext uri="{FF2B5EF4-FFF2-40B4-BE49-F238E27FC236}">
+                <a16:creationId xmlns:a16="http://schemas.microsoft.com/office/drawing/2014/main" id="{2E40DDCE-ADD9-455F-80A7-433C6BB4434C}"/>
+              </a:ext>
+            </a:extLst>
+          </p:cNvPr>
+          <p:cNvPicPr>
+            <a:picLocks noChangeAspect="1"/>
+          </p:cNvPicPr>
+          <p:nvPr/>
+        </p:nvPicPr>
+        <p:blipFill>
+          <a:blip r:embed="rId2">
+            <a:extLst>
+              <a:ext uri="{28A0092B-C50C-407E-A947-70E740481C1C}">
+                <a14:useLocalDpi xmlns:a14="http://schemas.microsoft.com/office/drawing/2010/main" val="0"/>
+              </a:ext>
+            </a:extLst>
+          </a:blip>
+          <a:stretch>
+            <a:fillRect/>
+          </a:stretch>
+        </p:blipFill>
+        <p:spPr>
+          <a:xfrm>
+            <a:off x="0" y="-11624"/>
+            <a:ext cx="12192000" cy="1104900"/>
+          </a:xfrm>
+          <a:prstGeom prst="rect">
+            <a:avLst/>
+          </a:prstGeom>
+        </p:spPr>
+      </p:pic>
+      <p:sp>
+        <p:nvSpPr>
+          <p:cNvPr id="4" name="Textfeld 3">
+            <a:extLst>
+              <a:ext uri="{FF2B5EF4-FFF2-40B4-BE49-F238E27FC236}">
+                <a16:creationId xmlns:a16="http://schemas.microsoft.com/office/drawing/2014/main" id="{5176D8E9-21C7-4EBF-8109-E2438C1F5AE7}"/>
+              </a:ext>
+            </a:extLst>
+          </p:cNvPr>
+          <p:cNvSpPr txBox="1"/>
+          <p:nvPr/>
+        </p:nvSpPr>
+        <p:spPr>
+          <a:xfrm>
+            <a:off x="4181494" y="1292095"/>
+            <a:ext cx="3829011" cy="954107"/>
+          </a:xfrm>
+          <a:prstGeom prst="rect">
+            <a:avLst/>
+          </a:prstGeom>
+          <a:noFill/>
+        </p:spPr>
+        <p:txBody>
+          <a:bodyPr wrap="square" rtlCol="0">
+            <a:spAutoFit/>
+          </a:bodyPr>
+          <a:lstStyle/>
+          <a:p>
+            <a:pPr algn="ctr"/>
+            <a:r>
+              <a:rPr lang="de-DE" sz="2800" b="1" dirty="0"/>
+              <a:t>Durchleitung an das Modell</a:t>
+            </a:r>
+            <a:endParaRPr lang="de-DE" sz="2800" dirty="0"/>
+          </a:p>
+        </p:txBody>
+      </p:sp>
+      <p:pic>
+        <p:nvPicPr>
+          <p:cNvPr id="5" name="Grafik 4" descr="Ein Bild, das Schild enthält.&#10;&#10;Mit hoher Zuverlässigkeit generierte Beschreibung">
+            <a:extLst>
+              <a:ext uri="{FF2B5EF4-FFF2-40B4-BE49-F238E27FC236}">
+                <a16:creationId xmlns:a16="http://schemas.microsoft.com/office/drawing/2014/main" id="{A149C8E7-2E27-4135-9C1C-DAA090589BA0}"/>
+              </a:ext>
+            </a:extLst>
+          </p:cNvPr>
+          <p:cNvPicPr>
+            <a:picLocks noChangeAspect="1"/>
+          </p:cNvPicPr>
+          <p:nvPr/>
+        </p:nvPicPr>
+        <p:blipFill>
+          <a:blip r:embed="rId3">
+            <a:extLst>
+              <a:ext uri="{28A0092B-C50C-407E-A947-70E740481C1C}">
+                <a14:useLocalDpi xmlns:a14="http://schemas.microsoft.com/office/drawing/2010/main" val="0"/>
+              </a:ext>
+            </a:extLst>
+          </a:blip>
+          <a:stretch>
+            <a:fillRect/>
+          </a:stretch>
+        </p:blipFill>
+        <p:spPr>
+          <a:xfrm>
+            <a:off x="4454149" y="2781709"/>
+            <a:ext cx="2876550" cy="2276475"/>
+          </a:xfrm>
+          <a:prstGeom prst="rect">
+            <a:avLst/>
+          </a:prstGeom>
+        </p:spPr>
+      </p:pic>
     </p:spTree>
     <p:extLst>
       <p:ext uri="{BB962C8B-B14F-4D97-AF65-F5344CB8AC3E}">
@@ -3811,10 +4871,83 @@
           <a:chExt cx="0" cy="0"/>
         </a:xfrm>
       </p:grpSpPr>
+      <p:pic>
+        <p:nvPicPr>
+          <p:cNvPr id="8" name="Grafik 7">
+            <a:extLst>
+              <a:ext uri="{FF2B5EF4-FFF2-40B4-BE49-F238E27FC236}">
+                <a16:creationId xmlns:a16="http://schemas.microsoft.com/office/drawing/2014/main" id="{83E8B718-28D6-431A-99B0-7A11F41324DF}"/>
+              </a:ext>
+            </a:extLst>
+          </p:cNvPr>
+          <p:cNvPicPr>
+            <a:picLocks noChangeAspect="1"/>
+          </p:cNvPicPr>
+          <p:nvPr/>
+        </p:nvPicPr>
+        <p:blipFill>
+          <a:blip r:embed="rId2">
+            <a:extLst>
+              <a:ext uri="{28A0092B-C50C-407E-A947-70E740481C1C}">
+                <a14:useLocalDpi xmlns:a14="http://schemas.microsoft.com/office/drawing/2010/main" val="0"/>
+              </a:ext>
+            </a:extLst>
+          </a:blip>
+          <a:stretch>
+            <a:fillRect/>
+          </a:stretch>
+        </p:blipFill>
+        <p:spPr>
+          <a:xfrm>
+            <a:off x="0" y="24822"/>
+            <a:ext cx="12192000" cy="6808356"/>
+          </a:xfrm>
+          <a:prstGeom prst="rect">
+            <a:avLst/>
+          </a:prstGeom>
+        </p:spPr>
+      </p:pic>
+      <p:sp>
+        <p:nvSpPr>
+          <p:cNvPr id="6" name="Textfeld 5">
+            <a:extLst>
+              <a:ext uri="{FF2B5EF4-FFF2-40B4-BE49-F238E27FC236}">
+                <a16:creationId xmlns:a16="http://schemas.microsoft.com/office/drawing/2014/main" id="{49B7B19A-E6BE-42A7-B82B-9CE5ED2AB38F}"/>
+              </a:ext>
+            </a:extLst>
+          </p:cNvPr>
+          <p:cNvSpPr txBox="1"/>
+          <p:nvPr/>
+        </p:nvSpPr>
+        <p:spPr>
+          <a:xfrm>
+            <a:off x="603504" y="3167390"/>
+            <a:ext cx="10125456" cy="954107"/>
+          </a:xfrm>
+          <a:prstGeom prst="rect">
+            <a:avLst/>
+          </a:prstGeom>
+          <a:noFill/>
+        </p:spPr>
+        <p:txBody>
+          <a:bodyPr wrap="square" rtlCol="0">
+            <a:spAutoFit/>
+          </a:bodyPr>
+          <a:lstStyle/>
+          <a:p>
+            <a:pPr algn="ctr"/>
+            <a:r>
+              <a:rPr lang="de-DE" sz="2800" b="1" dirty="0"/>
+              <a:t>Darstellung der im Modell erzeugten Informationen in einer Grafischen Benutzeroberfläche</a:t>
+            </a:r>
+            <a:endParaRPr lang="de-DE" sz="2800" dirty="0"/>
+          </a:p>
+        </p:txBody>
+      </p:sp>
     </p:spTree>
     <p:extLst>
       <p:ext uri="{BB962C8B-B14F-4D97-AF65-F5344CB8AC3E}">
-        <p14:creationId xmlns:p14="http://schemas.microsoft.com/office/powerpoint/2010/main" val="2127072071"/>
+        <p14:creationId xmlns:p14="http://schemas.microsoft.com/office/powerpoint/2010/main" val="970894650"/>
       </p:ext>
     </p:extLst>
   </p:cSld>
@@ -3841,10 +4974,119 @@
           <a:chExt cx="0" cy="0"/>
         </a:xfrm>
       </p:grpSpPr>
+      <p:pic>
+        <p:nvPicPr>
+          <p:cNvPr id="4" name="Grafik 3" descr="Ein Bild, das Objekt enthält.&#10;&#10;Mit hoher Zuverlässigkeit generierte Beschreibung">
+            <a:extLst>
+              <a:ext uri="{FF2B5EF4-FFF2-40B4-BE49-F238E27FC236}">
+                <a16:creationId xmlns:a16="http://schemas.microsoft.com/office/drawing/2014/main" id="{DCB59B41-2E20-4B4D-BE30-579B871C9419}"/>
+              </a:ext>
+            </a:extLst>
+          </p:cNvPr>
+          <p:cNvPicPr>
+            <a:picLocks noChangeAspect="1"/>
+          </p:cNvPicPr>
+          <p:nvPr/>
+        </p:nvPicPr>
+        <p:blipFill>
+          <a:blip r:embed="rId2">
+            <a:extLst>
+              <a:ext uri="{28A0092B-C50C-407E-A947-70E740481C1C}">
+                <a14:useLocalDpi xmlns:a14="http://schemas.microsoft.com/office/drawing/2010/main" val="0"/>
+              </a:ext>
+            </a:extLst>
+          </a:blip>
+          <a:stretch>
+            <a:fillRect/>
+          </a:stretch>
+        </p:blipFill>
+        <p:spPr>
+          <a:xfrm>
+            <a:off x="0" y="0"/>
+            <a:ext cx="12192000" cy="1104900"/>
+          </a:xfrm>
+          <a:prstGeom prst="rect">
+            <a:avLst/>
+          </a:prstGeom>
+        </p:spPr>
+      </p:pic>
+      <p:sp>
+        <p:nvSpPr>
+          <p:cNvPr id="3" name="Textfeld 2">
+            <a:extLst>
+              <a:ext uri="{FF2B5EF4-FFF2-40B4-BE49-F238E27FC236}">
+                <a16:creationId xmlns:a16="http://schemas.microsoft.com/office/drawing/2014/main" id="{C7876312-C065-47FC-AEE5-B48FFF87DE8F}"/>
+              </a:ext>
+            </a:extLst>
+          </p:cNvPr>
+          <p:cNvSpPr txBox="1"/>
+          <p:nvPr/>
+        </p:nvSpPr>
+        <p:spPr>
+          <a:xfrm>
+            <a:off x="2991172" y="1276597"/>
+            <a:ext cx="5439905" cy="523220"/>
+          </a:xfrm>
+          <a:prstGeom prst="rect">
+            <a:avLst/>
+          </a:prstGeom>
+          <a:noFill/>
+        </p:spPr>
+        <p:txBody>
+          <a:bodyPr wrap="square" rtlCol="0">
+            <a:spAutoFit/>
+          </a:bodyPr>
+          <a:lstStyle/>
+          <a:p>
+            <a:pPr algn="ctr"/>
+            <a:r>
+              <a:rPr lang="de-DE" sz="2800" b="1" dirty="0"/>
+              <a:t>Model-View-Controller</a:t>
+            </a:r>
+            <a:endParaRPr lang="de-DE" sz="2800" dirty="0"/>
+          </a:p>
+        </p:txBody>
+      </p:sp>
+      <p:pic>
+        <p:nvPicPr>
+          <p:cNvPr id="5" name="Grafik 4" descr="Ein Bild, das Schild enthält.&#10;&#10;Mit hoher Zuverlässigkeit generierte Beschreibung">
+            <a:extLst>
+              <a:ext uri="{FF2B5EF4-FFF2-40B4-BE49-F238E27FC236}">
+                <a16:creationId xmlns:a16="http://schemas.microsoft.com/office/drawing/2014/main" id="{A9575832-19A0-4FAC-9AAC-DCE72F7493C8}"/>
+              </a:ext>
+            </a:extLst>
+          </p:cNvPr>
+          <p:cNvPicPr>
+            <a:picLocks noChangeAspect="1"/>
+          </p:cNvPicPr>
+          <p:nvPr/>
+        </p:nvPicPr>
+        <p:blipFill>
+          <a:blip r:embed="rId3">
+            <a:extLst>
+              <a:ext uri="{28A0092B-C50C-407E-A947-70E740481C1C}">
+                <a14:useLocalDpi xmlns:a14="http://schemas.microsoft.com/office/drawing/2010/main" val="0"/>
+              </a:ext>
+            </a:extLst>
+          </a:blip>
+          <a:stretch>
+            <a:fillRect/>
+          </a:stretch>
+        </p:blipFill>
+        <p:spPr>
+          <a:xfrm>
+            <a:off x="4454149" y="2781709"/>
+            <a:ext cx="2876550" cy="2276475"/>
+          </a:xfrm>
+          <a:prstGeom prst="rect">
+            <a:avLst/>
+          </a:prstGeom>
+        </p:spPr>
+      </p:pic>
     </p:spTree>
     <p:extLst>
       <p:ext uri="{BB962C8B-B14F-4D97-AF65-F5344CB8AC3E}">
-        <p14:creationId xmlns:p14="http://schemas.microsoft.com/office/powerpoint/2010/main" val="2674086462"/>
+        <p14:creationId xmlns:p14="http://schemas.microsoft.com/office/powerpoint/2010/main" val="1976841839"/>
       </p:ext>
     </p:extLst>
   </p:cSld>
@@ -3871,10 +5113,119 @@
           <a:chExt cx="0" cy="0"/>
         </a:xfrm>
       </p:grpSpPr>
+      <p:pic>
+        <p:nvPicPr>
+          <p:cNvPr id="3" name="Grafik 2">
+            <a:extLst>
+              <a:ext uri="{FF2B5EF4-FFF2-40B4-BE49-F238E27FC236}">
+                <a16:creationId xmlns:a16="http://schemas.microsoft.com/office/drawing/2014/main" id="{2E40DDCE-ADD9-455F-80A7-433C6BB4434C}"/>
+              </a:ext>
+            </a:extLst>
+          </p:cNvPr>
+          <p:cNvPicPr>
+            <a:picLocks noChangeAspect="1"/>
+          </p:cNvPicPr>
+          <p:nvPr/>
+        </p:nvPicPr>
+        <p:blipFill>
+          <a:blip r:embed="rId2">
+            <a:extLst>
+              <a:ext uri="{28A0092B-C50C-407E-A947-70E740481C1C}">
+                <a14:useLocalDpi xmlns:a14="http://schemas.microsoft.com/office/drawing/2010/main" val="0"/>
+              </a:ext>
+            </a:extLst>
+          </a:blip>
+          <a:stretch>
+            <a:fillRect/>
+          </a:stretch>
+        </p:blipFill>
+        <p:spPr>
+          <a:xfrm>
+            <a:off x="0" y="-11624"/>
+            <a:ext cx="12192000" cy="1104900"/>
+          </a:xfrm>
+          <a:prstGeom prst="rect">
+            <a:avLst/>
+          </a:prstGeom>
+        </p:spPr>
+      </p:pic>
+      <p:sp>
+        <p:nvSpPr>
+          <p:cNvPr id="4" name="Textfeld 3">
+            <a:extLst>
+              <a:ext uri="{FF2B5EF4-FFF2-40B4-BE49-F238E27FC236}">
+                <a16:creationId xmlns:a16="http://schemas.microsoft.com/office/drawing/2014/main" id="{1E4459E6-FF53-4466-B956-37CFC9C8E0C2}"/>
+              </a:ext>
+            </a:extLst>
+          </p:cNvPr>
+          <p:cNvSpPr txBox="1"/>
+          <p:nvPr/>
+        </p:nvSpPr>
+        <p:spPr>
+          <a:xfrm>
+            <a:off x="4524575" y="1276597"/>
+            <a:ext cx="2806124" cy="523220"/>
+          </a:xfrm>
+          <a:prstGeom prst="rect">
+            <a:avLst/>
+          </a:prstGeom>
+          <a:noFill/>
+        </p:spPr>
+        <p:txBody>
+          <a:bodyPr wrap="square" rtlCol="0">
+            <a:spAutoFit/>
+          </a:bodyPr>
+          <a:lstStyle/>
+          <a:p>
+            <a:pPr algn="ctr"/>
+            <a:r>
+              <a:rPr lang="de-DE" sz="2800" b="1" dirty="0"/>
+              <a:t>Modell = View</a:t>
+            </a:r>
+            <a:endParaRPr lang="de-DE" sz="2800" dirty="0"/>
+          </a:p>
+        </p:txBody>
+      </p:sp>
+      <p:pic>
+        <p:nvPicPr>
+          <p:cNvPr id="5" name="Grafik 4" descr="Ein Bild, das Schild enthält.&#10;&#10;Mit hoher Zuverlässigkeit generierte Beschreibung">
+            <a:extLst>
+              <a:ext uri="{FF2B5EF4-FFF2-40B4-BE49-F238E27FC236}">
+                <a16:creationId xmlns:a16="http://schemas.microsoft.com/office/drawing/2014/main" id="{F61EEEF2-1F85-484C-93AC-C4AB86EA7177}"/>
+              </a:ext>
+            </a:extLst>
+          </p:cNvPr>
+          <p:cNvPicPr>
+            <a:picLocks noChangeAspect="1"/>
+          </p:cNvPicPr>
+          <p:nvPr/>
+        </p:nvPicPr>
+        <p:blipFill>
+          <a:blip r:embed="rId3">
+            <a:extLst>
+              <a:ext uri="{28A0092B-C50C-407E-A947-70E740481C1C}">
+                <a14:useLocalDpi xmlns:a14="http://schemas.microsoft.com/office/drawing/2010/main" val="0"/>
+              </a:ext>
+            </a:extLst>
+          </a:blip>
+          <a:stretch>
+            <a:fillRect/>
+          </a:stretch>
+        </p:blipFill>
+        <p:spPr>
+          <a:xfrm>
+            <a:off x="4454149" y="2781709"/>
+            <a:ext cx="2876550" cy="2276475"/>
+          </a:xfrm>
+          <a:prstGeom prst="rect">
+            <a:avLst/>
+          </a:prstGeom>
+        </p:spPr>
+      </p:pic>
     </p:spTree>
     <p:extLst>
       <p:ext uri="{BB962C8B-B14F-4D97-AF65-F5344CB8AC3E}">
-        <p14:creationId xmlns:p14="http://schemas.microsoft.com/office/powerpoint/2010/main" val="3018050981"/>
+        <p14:creationId xmlns:p14="http://schemas.microsoft.com/office/powerpoint/2010/main" val="680814583"/>
       </p:ext>
     </p:extLst>
   </p:cSld>
@@ -3901,10 +5252,83 @@
           <a:chExt cx="0" cy="0"/>
         </a:xfrm>
       </p:grpSpPr>
+      <p:pic>
+        <p:nvPicPr>
+          <p:cNvPr id="8" name="Grafik 7">
+            <a:extLst>
+              <a:ext uri="{FF2B5EF4-FFF2-40B4-BE49-F238E27FC236}">
+                <a16:creationId xmlns:a16="http://schemas.microsoft.com/office/drawing/2014/main" id="{83E8B718-28D6-431A-99B0-7A11F41324DF}"/>
+              </a:ext>
+            </a:extLst>
+          </p:cNvPr>
+          <p:cNvPicPr>
+            <a:picLocks noChangeAspect="1"/>
+          </p:cNvPicPr>
+          <p:nvPr/>
+        </p:nvPicPr>
+        <p:blipFill>
+          <a:blip r:embed="rId2">
+            <a:extLst>
+              <a:ext uri="{28A0092B-C50C-407E-A947-70E740481C1C}">
+                <a14:useLocalDpi xmlns:a14="http://schemas.microsoft.com/office/drawing/2010/main" val="0"/>
+              </a:ext>
+            </a:extLst>
+          </a:blip>
+          <a:stretch>
+            <a:fillRect/>
+          </a:stretch>
+        </p:blipFill>
+        <p:spPr>
+          <a:xfrm>
+            <a:off x="0" y="24822"/>
+            <a:ext cx="12192000" cy="6808356"/>
+          </a:xfrm>
+          <a:prstGeom prst="rect">
+            <a:avLst/>
+          </a:prstGeom>
+        </p:spPr>
+      </p:pic>
+      <p:sp>
+        <p:nvSpPr>
+          <p:cNvPr id="6" name="Textfeld 5">
+            <a:extLst>
+              <a:ext uri="{FF2B5EF4-FFF2-40B4-BE49-F238E27FC236}">
+                <a16:creationId xmlns:a16="http://schemas.microsoft.com/office/drawing/2014/main" id="{49B7B19A-E6BE-42A7-B82B-9CE5ED2AB38F}"/>
+              </a:ext>
+            </a:extLst>
+          </p:cNvPr>
+          <p:cNvSpPr txBox="1"/>
+          <p:nvPr/>
+        </p:nvSpPr>
+        <p:spPr>
+          <a:xfrm>
+            <a:off x="603504" y="3167390"/>
+            <a:ext cx="10125456" cy="523220"/>
+          </a:xfrm>
+          <a:prstGeom prst="rect">
+            <a:avLst/>
+          </a:prstGeom>
+          <a:noFill/>
+        </p:spPr>
+        <p:txBody>
+          <a:bodyPr wrap="square" rtlCol="0">
+            <a:spAutoFit/>
+          </a:bodyPr>
+          <a:lstStyle/>
+          <a:p>
+            <a:pPr algn="ctr"/>
+            <a:r>
+              <a:rPr lang="de-DE" sz="2800" b="1" dirty="0"/>
+              <a:t>Kommunikation der Systemmodule untereinander</a:t>
+            </a:r>
+            <a:endParaRPr lang="de-DE" sz="2800" dirty="0"/>
+          </a:p>
+        </p:txBody>
+      </p:sp>
     </p:spTree>
     <p:extLst>
       <p:ext uri="{BB962C8B-B14F-4D97-AF65-F5344CB8AC3E}">
-        <p14:creationId xmlns:p14="http://schemas.microsoft.com/office/powerpoint/2010/main" val="58980988"/>
+        <p14:creationId xmlns:p14="http://schemas.microsoft.com/office/powerpoint/2010/main" val="3623192212"/>
       </p:ext>
     </p:extLst>
   </p:cSld>
@@ -3931,10 +5355,119 @@
           <a:chExt cx="0" cy="0"/>
         </a:xfrm>
       </p:grpSpPr>
+      <p:pic>
+        <p:nvPicPr>
+          <p:cNvPr id="4" name="Grafik 3" descr="Ein Bild, das Objekt enthält.&#10;&#10;Mit hoher Zuverlässigkeit generierte Beschreibung">
+            <a:extLst>
+              <a:ext uri="{FF2B5EF4-FFF2-40B4-BE49-F238E27FC236}">
+                <a16:creationId xmlns:a16="http://schemas.microsoft.com/office/drawing/2014/main" id="{DCB59B41-2E20-4B4D-BE30-579B871C9419}"/>
+              </a:ext>
+            </a:extLst>
+          </p:cNvPr>
+          <p:cNvPicPr>
+            <a:picLocks noChangeAspect="1"/>
+          </p:cNvPicPr>
+          <p:nvPr/>
+        </p:nvPicPr>
+        <p:blipFill>
+          <a:blip r:embed="rId2">
+            <a:extLst>
+              <a:ext uri="{28A0092B-C50C-407E-A947-70E740481C1C}">
+                <a14:useLocalDpi xmlns:a14="http://schemas.microsoft.com/office/drawing/2010/main" val="0"/>
+              </a:ext>
+            </a:extLst>
+          </a:blip>
+          <a:stretch>
+            <a:fillRect/>
+          </a:stretch>
+        </p:blipFill>
+        <p:spPr>
+          <a:xfrm>
+            <a:off x="0" y="0"/>
+            <a:ext cx="12192000" cy="1104900"/>
+          </a:xfrm>
+          <a:prstGeom prst="rect">
+            <a:avLst/>
+          </a:prstGeom>
+        </p:spPr>
+      </p:pic>
+      <p:sp>
+        <p:nvSpPr>
+          <p:cNvPr id="3" name="Textfeld 2">
+            <a:extLst>
+              <a:ext uri="{FF2B5EF4-FFF2-40B4-BE49-F238E27FC236}">
+                <a16:creationId xmlns:a16="http://schemas.microsoft.com/office/drawing/2014/main" id="{7090C0D5-04E7-4996-9182-E46600BF07A4}"/>
+              </a:ext>
+            </a:extLst>
+          </p:cNvPr>
+          <p:cNvSpPr txBox="1"/>
+          <p:nvPr/>
+        </p:nvSpPr>
+        <p:spPr>
+          <a:xfrm>
+            <a:off x="4524575" y="1276597"/>
+            <a:ext cx="2806124" cy="523220"/>
+          </a:xfrm>
+          <a:prstGeom prst="rect">
+            <a:avLst/>
+          </a:prstGeom>
+          <a:noFill/>
+        </p:spPr>
+        <p:txBody>
+          <a:bodyPr wrap="square" rtlCol="0">
+            <a:spAutoFit/>
+          </a:bodyPr>
+          <a:lstStyle/>
+          <a:p>
+            <a:pPr algn="ctr"/>
+            <a:r>
+              <a:rPr lang="de-DE" sz="2800" b="1" dirty="0"/>
+              <a:t>Fassaden</a:t>
+            </a:r>
+            <a:endParaRPr lang="de-DE" sz="2800" dirty="0"/>
+          </a:p>
+        </p:txBody>
+      </p:sp>
+      <p:pic>
+        <p:nvPicPr>
+          <p:cNvPr id="5" name="Grafik 4" descr="Ein Bild, das Schild enthält.&#10;&#10;Mit hoher Zuverlässigkeit generierte Beschreibung">
+            <a:extLst>
+              <a:ext uri="{FF2B5EF4-FFF2-40B4-BE49-F238E27FC236}">
+                <a16:creationId xmlns:a16="http://schemas.microsoft.com/office/drawing/2014/main" id="{0889F849-A1E6-4593-B880-50345978A873}"/>
+              </a:ext>
+            </a:extLst>
+          </p:cNvPr>
+          <p:cNvPicPr>
+            <a:picLocks noChangeAspect="1"/>
+          </p:cNvPicPr>
+          <p:nvPr/>
+        </p:nvPicPr>
+        <p:blipFill>
+          <a:blip r:embed="rId3">
+            <a:extLst>
+              <a:ext uri="{28A0092B-C50C-407E-A947-70E740481C1C}">
+                <a14:useLocalDpi xmlns:a14="http://schemas.microsoft.com/office/drawing/2010/main" val="0"/>
+              </a:ext>
+            </a:extLst>
+          </a:blip>
+          <a:stretch>
+            <a:fillRect/>
+          </a:stretch>
+        </p:blipFill>
+        <p:spPr>
+          <a:xfrm>
+            <a:off x="4454149" y="2781709"/>
+            <a:ext cx="2876550" cy="2276475"/>
+          </a:xfrm>
+          <a:prstGeom prst="rect">
+            <a:avLst/>
+          </a:prstGeom>
+        </p:spPr>
+      </p:pic>
     </p:spTree>
     <p:extLst>
       <p:ext uri="{BB962C8B-B14F-4D97-AF65-F5344CB8AC3E}">
-        <p14:creationId xmlns:p14="http://schemas.microsoft.com/office/powerpoint/2010/main" val="4190608569"/>
+        <p14:creationId xmlns:p14="http://schemas.microsoft.com/office/powerpoint/2010/main" val="826794636"/>
       </p:ext>
     </p:extLst>
   </p:cSld>

</xml_diff>